<commit_message>
add page to denotational_semantic.pptx
</commit_message>
<xml_diff>
--- a/material/denotational_semantics.pptx
+++ b/material/denotational_semantics.pptx
@@ -5,19 +5,20 @@
     <p:sldMasterId id="2147483648" r:id="rId1"/>
   </p:sldMasterIdLst>
   <p:notesMasterIdLst>
-    <p:notesMasterId r:id="rId12"/>
+    <p:notesMasterId r:id="rId13"/>
   </p:notesMasterIdLst>
   <p:sldIdLst>
     <p:sldId id="256" r:id="rId2"/>
     <p:sldId id="258" r:id="rId3"/>
     <p:sldId id="257" r:id="rId4"/>
     <p:sldId id="260" r:id="rId5"/>
-    <p:sldId id="261" r:id="rId6"/>
-    <p:sldId id="262" r:id="rId7"/>
-    <p:sldId id="263" r:id="rId8"/>
-    <p:sldId id="264" r:id="rId9"/>
-    <p:sldId id="265" r:id="rId10"/>
-    <p:sldId id="266" r:id="rId11"/>
+    <p:sldId id="267" r:id="rId6"/>
+    <p:sldId id="261" r:id="rId7"/>
+    <p:sldId id="262" r:id="rId8"/>
+    <p:sldId id="263" r:id="rId9"/>
+    <p:sldId id="264" r:id="rId10"/>
+    <p:sldId id="265" r:id="rId11"/>
+    <p:sldId id="266" r:id="rId12"/>
   </p:sldIdLst>
   <p:sldSz cx="9144000" cy="6858000" type="screen4x3"/>
   <p:notesSz cx="6858000" cy="9144000"/>
@@ -4067,10 +4068,572 @@
   <p:clrMapOvr>
     <a:masterClrMapping/>
   </p:clrMapOvr>
+  <p:timing>
+    <p:tnLst>
+      <p:par>
+        <p:cTn id="1" dur="indefinite" restart="never" nodeType="tmRoot"/>
+      </p:par>
+    </p:tnLst>
+  </p:timing>
 </p:sld>
 </file>
 
 <file path=ppt/slides/slide10.xml><?xml version="1.0" encoding="utf-8"?>
+<p:sld xmlns:a="http://schemas.openxmlformats.org/drawingml/2006/main" xmlns:r="http://schemas.openxmlformats.org/officeDocument/2006/relationships" xmlns:p="http://schemas.openxmlformats.org/presentationml/2006/main">
+  <p:cSld>
+    <p:spTree>
+      <p:nvGrpSpPr>
+        <p:cNvPr id="1" name=""/>
+        <p:cNvGrpSpPr/>
+        <p:nvPr/>
+      </p:nvGrpSpPr>
+      <p:grpSpPr>
+        <a:xfrm>
+          <a:off x="0" y="0"/>
+          <a:ext cx="0" cy="0"/>
+          <a:chOff x="0" y="0"/>
+          <a:chExt cx="0" cy="0"/>
+        </a:xfrm>
+      </p:grpSpPr>
+      <p:sp>
+        <p:nvSpPr>
+          <p:cNvPr id="2" name="タイトル 1"/>
+          <p:cNvSpPr>
+            <a:spLocks noGrp="1"/>
+          </p:cNvSpPr>
+          <p:nvPr>
+            <p:ph type="title"/>
+          </p:nvPr>
+        </p:nvSpPr>
+        <p:spPr>
+          <a:xfrm>
+            <a:off x="467544" y="145761"/>
+            <a:ext cx="8229600" cy="1143000"/>
+          </a:xfrm>
+        </p:spPr>
+        <p:txBody>
+          <a:bodyPr/>
+          <a:lstStyle/>
+          <a:p>
+            <a:r>
+              <a:rPr kumimoji="1" lang="ja-JP" altLang="en-US" dirty="0" smtClean="0"/>
+              <a:t>応用</a:t>
+            </a:r>
+            <a:endParaRPr kumimoji="1" lang="ja-JP" altLang="en-US" dirty="0"/>
+          </a:p>
+        </p:txBody>
+      </p:sp>
+      <p:sp>
+        <p:nvSpPr>
+          <p:cNvPr id="4" name="角丸四角形 3"/>
+          <p:cNvSpPr/>
+          <p:nvPr/>
+        </p:nvSpPr>
+        <p:spPr>
+          <a:xfrm>
+            <a:off x="5076056" y="1442834"/>
+            <a:ext cx="1584176" cy="1136263"/>
+          </a:xfrm>
+          <a:prstGeom prst="roundRect">
+            <a:avLst/>
+          </a:prstGeom>
+        </p:spPr>
+        <p:style>
+          <a:lnRef idx="0">
+            <a:schemeClr val="accent2"/>
+          </a:lnRef>
+          <a:fillRef idx="3">
+            <a:schemeClr val="accent2"/>
+          </a:fillRef>
+          <a:effectRef idx="3">
+            <a:schemeClr val="accent2"/>
+          </a:effectRef>
+          <a:fontRef idx="minor">
+            <a:schemeClr val="lt1"/>
+          </a:fontRef>
+        </p:style>
+        <p:txBody>
+          <a:bodyPr rtlCol="0" anchor="ctr"/>
+          <a:lstStyle/>
+          <a:p>
+            <a:pPr algn="ctr"/>
+            <a:r>
+              <a:rPr kumimoji="1" lang="en-US" altLang="ja-JP" sz="2800" b="1" dirty="0" smtClean="0"/>
+              <a:t>Ruby</a:t>
+            </a:r>
+          </a:p>
+          <a:p>
+            <a:pPr algn="ctr"/>
+            <a:r>
+              <a:rPr lang="ja-JP" altLang="en-US" sz="2800" b="1" dirty="0"/>
+              <a:t>コード</a:t>
+            </a:r>
+            <a:endParaRPr kumimoji="1" lang="ja-JP" altLang="en-US" sz="2800" b="1" dirty="0"/>
+          </a:p>
+        </p:txBody>
+      </p:sp>
+      <p:sp>
+        <p:nvSpPr>
+          <p:cNvPr id="5" name="右矢印 4"/>
+          <p:cNvSpPr/>
+          <p:nvPr/>
+        </p:nvSpPr>
+        <p:spPr>
+          <a:xfrm>
+            <a:off x="3851920" y="1326552"/>
+            <a:ext cx="936104" cy="1252547"/>
+          </a:xfrm>
+          <a:prstGeom prst="rightArrow">
+            <a:avLst/>
+          </a:prstGeom>
+        </p:spPr>
+        <p:style>
+          <a:lnRef idx="2">
+            <a:schemeClr val="accent1">
+              <a:shade val="50000"/>
+            </a:schemeClr>
+          </a:lnRef>
+          <a:fillRef idx="1">
+            <a:schemeClr val="accent1"/>
+          </a:fillRef>
+          <a:effectRef idx="0">
+            <a:schemeClr val="accent1"/>
+          </a:effectRef>
+          <a:fontRef idx="minor">
+            <a:schemeClr val="lt1"/>
+          </a:fontRef>
+        </p:style>
+        <p:txBody>
+          <a:bodyPr rtlCol="0" anchor="ctr"/>
+          <a:lstStyle/>
+          <a:p>
+            <a:pPr algn="ctr"/>
+            <a:r>
+              <a:rPr lang="ja-JP" altLang="en-US" sz="2000" b="1" dirty="0">
+                <a:solidFill>
+                  <a:schemeClr val="bg1"/>
+                </a:solidFill>
+              </a:rPr>
+              <a:t>変換</a:t>
+            </a:r>
+            <a:endParaRPr kumimoji="1" lang="ja-JP" altLang="en-US" b="1" dirty="0">
+              <a:solidFill>
+                <a:schemeClr val="bg1"/>
+              </a:solidFill>
+            </a:endParaRPr>
+          </a:p>
+        </p:txBody>
+      </p:sp>
+      <p:sp>
+        <p:nvSpPr>
+          <p:cNvPr id="7" name="右矢印 6"/>
+          <p:cNvSpPr/>
+          <p:nvPr/>
+        </p:nvSpPr>
+        <p:spPr>
+          <a:xfrm>
+            <a:off x="3851920" y="3356992"/>
+            <a:ext cx="936104" cy="1252547"/>
+          </a:xfrm>
+          <a:prstGeom prst="rightArrow">
+            <a:avLst/>
+          </a:prstGeom>
+        </p:spPr>
+        <p:style>
+          <a:lnRef idx="2">
+            <a:schemeClr val="accent1">
+              <a:shade val="50000"/>
+            </a:schemeClr>
+          </a:lnRef>
+          <a:fillRef idx="1">
+            <a:schemeClr val="accent1"/>
+          </a:fillRef>
+          <a:effectRef idx="0">
+            <a:schemeClr val="accent1"/>
+          </a:effectRef>
+          <a:fontRef idx="minor">
+            <a:schemeClr val="lt1"/>
+          </a:fontRef>
+        </p:style>
+        <p:txBody>
+          <a:bodyPr rtlCol="0" anchor="ctr"/>
+          <a:lstStyle/>
+          <a:p>
+            <a:pPr algn="ctr"/>
+            <a:r>
+              <a:rPr lang="ja-JP" altLang="en-US" sz="2000" b="1" dirty="0">
+                <a:solidFill>
+                  <a:schemeClr val="bg1"/>
+                </a:solidFill>
+              </a:rPr>
+              <a:t>変換</a:t>
+            </a:r>
+            <a:endParaRPr kumimoji="1" lang="ja-JP" altLang="en-US" b="1" dirty="0">
+              <a:solidFill>
+                <a:schemeClr val="bg1"/>
+              </a:solidFill>
+            </a:endParaRPr>
+          </a:p>
+        </p:txBody>
+      </p:sp>
+      <p:sp>
+        <p:nvSpPr>
+          <p:cNvPr id="8" name="右矢印 7"/>
+          <p:cNvSpPr/>
+          <p:nvPr/>
+        </p:nvSpPr>
+        <p:spPr>
+          <a:xfrm>
+            <a:off x="3851920" y="4797152"/>
+            <a:ext cx="936104" cy="1252547"/>
+          </a:xfrm>
+          <a:prstGeom prst="rightArrow">
+            <a:avLst/>
+          </a:prstGeom>
+        </p:spPr>
+        <p:style>
+          <a:lnRef idx="2">
+            <a:schemeClr val="accent1">
+              <a:shade val="50000"/>
+            </a:schemeClr>
+          </a:lnRef>
+          <a:fillRef idx="1">
+            <a:schemeClr val="accent1"/>
+          </a:fillRef>
+          <a:effectRef idx="0">
+            <a:schemeClr val="accent1"/>
+          </a:effectRef>
+          <a:fontRef idx="minor">
+            <a:schemeClr val="lt1"/>
+          </a:fontRef>
+        </p:style>
+        <p:txBody>
+          <a:bodyPr rtlCol="0" anchor="ctr"/>
+          <a:lstStyle/>
+          <a:p>
+            <a:pPr algn="ctr"/>
+            <a:r>
+              <a:rPr lang="ja-JP" altLang="en-US" sz="2000" b="1" dirty="0">
+                <a:solidFill>
+                  <a:schemeClr val="bg1"/>
+                </a:solidFill>
+              </a:rPr>
+              <a:t>変換</a:t>
+            </a:r>
+            <a:endParaRPr kumimoji="1" lang="ja-JP" altLang="en-US" b="1" dirty="0">
+              <a:solidFill>
+                <a:schemeClr val="bg1"/>
+              </a:solidFill>
+            </a:endParaRPr>
+          </a:p>
+        </p:txBody>
+      </p:sp>
+      <p:pic>
+        <p:nvPicPr>
+          <p:cNvPr id="1026" name="Picture 2" descr="D:\Temp\Temporary Internet Files\Content.IE5\0PIY0UOG\abc2[1].jpg"/>
+          <p:cNvPicPr>
+            <a:picLocks noChangeAspect="1" noChangeArrowheads="1"/>
+          </p:cNvPicPr>
+          <p:nvPr/>
+        </p:nvPicPr>
+        <p:blipFill>
+          <a:blip r:embed="rId2" cstate="print">
+            <a:extLst>
+              <a:ext uri="{28A0092B-C50C-407E-A947-70E740481C1C}">
+                <a14:useLocalDpi xmlns:a14="http://schemas.microsoft.com/office/drawing/2010/main" val="0"/>
+              </a:ext>
+            </a:extLst>
+          </a:blip>
+          <a:srcRect/>
+          <a:stretch>
+            <a:fillRect/>
+          </a:stretch>
+        </p:blipFill>
+        <p:spPr bwMode="auto">
+          <a:xfrm>
+            <a:off x="5091562" y="3641200"/>
+            <a:ext cx="1590943" cy="1147752"/>
+          </a:xfrm>
+          <a:prstGeom prst="rect">
+            <a:avLst/>
+          </a:prstGeom>
+          <a:noFill/>
+          <a:extLst>
+            <a:ext uri="{909E8E84-426E-40DD-AFC4-6F175D3DCCD1}">
+              <a14:hiddenFill xmlns:a14="http://schemas.microsoft.com/office/drawing/2010/main">
+                <a:solidFill>
+                  <a:srgbClr val="FFFFFF"/>
+                </a:solidFill>
+              </a14:hiddenFill>
+            </a:ext>
+          </a:extLst>
+        </p:spPr>
+      </p:pic>
+      <p:sp>
+        <p:nvSpPr>
+          <p:cNvPr id="9" name="テキスト ボックス 8"/>
+          <p:cNvSpPr txBox="1"/>
+          <p:nvPr/>
+        </p:nvSpPr>
+        <p:spPr>
+          <a:xfrm>
+            <a:off x="5468034" y="3375698"/>
+            <a:ext cx="800219" cy="461665"/>
+          </a:xfrm>
+          <a:prstGeom prst="rect">
+            <a:avLst/>
+          </a:prstGeom>
+          <a:noFill/>
+        </p:spPr>
+        <p:txBody>
+          <a:bodyPr wrap="none" rtlCol="0">
+            <a:spAutoFit/>
+          </a:bodyPr>
+          <a:lstStyle/>
+          <a:p>
+            <a:r>
+              <a:rPr lang="ja-JP" altLang="en-US" sz="2400" b="1" dirty="0"/>
+              <a:t>英語</a:t>
+            </a:r>
+            <a:endParaRPr kumimoji="1" lang="ja-JP" altLang="en-US" b="1" dirty="0"/>
+          </a:p>
+        </p:txBody>
+      </p:sp>
+      <p:pic>
+        <p:nvPicPr>
+          <p:cNvPr id="1027" name="Picture 3" descr="D:\Temp\Temporary Internet Files\Content.IE5\G4A5GR24\gi01a201312111400[1].png"/>
+          <p:cNvPicPr>
+            <a:picLocks noChangeAspect="1" noChangeArrowheads="1"/>
+          </p:cNvPicPr>
+          <p:nvPr/>
+        </p:nvPicPr>
+        <p:blipFill>
+          <a:blip r:embed="rId3" cstate="print">
+            <a:extLst>
+              <a:ext uri="{28A0092B-C50C-407E-A947-70E740481C1C}">
+                <a14:useLocalDpi xmlns:a14="http://schemas.microsoft.com/office/drawing/2010/main" val="0"/>
+              </a:ext>
+            </a:extLst>
+          </a:blip>
+          <a:srcRect/>
+          <a:stretch>
+            <a:fillRect/>
+          </a:stretch>
+        </p:blipFill>
+        <p:spPr bwMode="auto">
+          <a:xfrm>
+            <a:off x="4853419" y="5423425"/>
+            <a:ext cx="2029447" cy="1086599"/>
+          </a:xfrm>
+          <a:prstGeom prst="rect">
+            <a:avLst/>
+          </a:prstGeom>
+          <a:noFill/>
+          <a:extLst>
+            <a:ext uri="{909E8E84-426E-40DD-AFC4-6F175D3DCCD1}">
+              <a14:hiddenFill xmlns:a14="http://schemas.microsoft.com/office/drawing/2010/main">
+                <a:solidFill>
+                  <a:srgbClr val="FFFFFF"/>
+                </a:solidFill>
+              </a14:hiddenFill>
+            </a:ext>
+          </a:extLst>
+        </p:spPr>
+      </p:pic>
+      <p:sp>
+        <p:nvSpPr>
+          <p:cNvPr id="12" name="テキスト ボックス 11"/>
+          <p:cNvSpPr txBox="1"/>
+          <p:nvPr/>
+        </p:nvSpPr>
+        <p:spPr>
+          <a:xfrm>
+            <a:off x="5021251" y="4960998"/>
+            <a:ext cx="1731564" cy="461665"/>
+          </a:xfrm>
+          <a:prstGeom prst="rect">
+            <a:avLst/>
+          </a:prstGeom>
+          <a:noFill/>
+        </p:spPr>
+        <p:txBody>
+          <a:bodyPr wrap="none" rtlCol="0">
+            <a:spAutoFit/>
+          </a:bodyPr>
+          <a:lstStyle/>
+          <a:p>
+            <a:r>
+              <a:rPr lang="ja-JP" altLang="en-US" sz="2400" b="1" dirty="0"/>
+              <a:t>数学的表記</a:t>
+            </a:r>
+            <a:endParaRPr kumimoji="1" lang="ja-JP" altLang="en-US" b="1" dirty="0"/>
+          </a:p>
+        </p:txBody>
+      </p:sp>
+      <p:sp>
+        <p:nvSpPr>
+          <p:cNvPr id="10" name="コンテンツ プレースホルダー 9"/>
+          <p:cNvSpPr>
+            <a:spLocks noGrp="1"/>
+          </p:cNvSpPr>
+          <p:nvPr>
+            <p:ph idx="1"/>
+          </p:nvPr>
+        </p:nvSpPr>
+        <p:spPr>
+          <a:xfrm>
+            <a:off x="467544" y="1326552"/>
+            <a:ext cx="8229600" cy="5933256"/>
+          </a:xfrm>
+        </p:spPr>
+        <p:txBody>
+          <a:bodyPr>
+            <a:normAutofit/>
+          </a:bodyPr>
+          <a:lstStyle/>
+          <a:p>
+            <a:pPr marL="0" indent="0">
+              <a:buNone/>
+            </a:pPr>
+            <a:endParaRPr lang="en-US" altLang="ja-JP" dirty="0"/>
+          </a:p>
+          <a:p>
+            <a:pPr marL="0" indent="0">
+              <a:buNone/>
+            </a:pPr>
+            <a:r>
+              <a:rPr kumimoji="1" lang="en-US" altLang="ja-JP" dirty="0" smtClean="0"/>
+              <a:t>							</a:t>
+            </a:r>
+            <a:r>
+              <a:rPr kumimoji="1" lang="ja-JP" altLang="en-US" dirty="0" smtClean="0"/>
+              <a:t>← 今回</a:t>
+            </a:r>
+            <a:endParaRPr kumimoji="1" lang="en-US" altLang="ja-JP" dirty="0" smtClean="0"/>
+          </a:p>
+          <a:p>
+            <a:pPr marL="0" indent="0">
+              <a:buNone/>
+            </a:pPr>
+            <a:endParaRPr lang="en-US" altLang="ja-JP" dirty="0"/>
+          </a:p>
+          <a:p>
+            <a:pPr marL="0" indent="0">
+              <a:buNone/>
+            </a:pPr>
+            <a:endParaRPr kumimoji="1" lang="en-US" altLang="ja-JP" dirty="0" smtClean="0"/>
+          </a:p>
+          <a:p>
+            <a:pPr marL="0" indent="0">
+              <a:buNone/>
+            </a:pPr>
+            <a:endParaRPr lang="en-US" altLang="ja-JP" dirty="0"/>
+          </a:p>
+          <a:p>
+            <a:pPr marL="0" indent="0">
+              <a:buNone/>
+            </a:pPr>
+            <a:endParaRPr kumimoji="1" lang="en-US" altLang="ja-JP" dirty="0" smtClean="0"/>
+          </a:p>
+          <a:p>
+            <a:pPr marL="0" indent="0">
+              <a:buNone/>
+            </a:pPr>
+            <a:endParaRPr lang="en-US" altLang="ja-JP" dirty="0"/>
+          </a:p>
+          <a:p>
+            <a:pPr marL="0" indent="0">
+              <a:buNone/>
+            </a:pPr>
+            <a:endParaRPr lang="en-US" altLang="ja-JP" sz="3600" dirty="0" smtClean="0"/>
+          </a:p>
+          <a:p>
+            <a:pPr marL="0" indent="0">
+              <a:buNone/>
+            </a:pPr>
+            <a:r>
+              <a:rPr lang="ja-JP" altLang="en-US" sz="3600" dirty="0" smtClean="0"/>
+              <a:t>どれでも</a:t>
+            </a:r>
+            <a:r>
+              <a:rPr lang="en-US" altLang="ja-JP" sz="3600" dirty="0" smtClean="0"/>
+              <a:t>OK</a:t>
+            </a:r>
+            <a:endParaRPr kumimoji="1" lang="ja-JP" altLang="en-US" sz="3600" dirty="0"/>
+          </a:p>
+        </p:txBody>
+      </p:sp>
+      <p:sp>
+        <p:nvSpPr>
+          <p:cNvPr id="14" name="角丸四角形 13"/>
+          <p:cNvSpPr/>
+          <p:nvPr/>
+        </p:nvSpPr>
+        <p:spPr>
+          <a:xfrm>
+            <a:off x="755576" y="2718869"/>
+            <a:ext cx="2448272" cy="2242129"/>
+          </a:xfrm>
+          <a:prstGeom prst="roundRect">
+            <a:avLst/>
+          </a:prstGeom>
+        </p:spPr>
+        <p:style>
+          <a:lnRef idx="0">
+            <a:schemeClr val="accent2"/>
+          </a:lnRef>
+          <a:fillRef idx="3">
+            <a:schemeClr val="accent2"/>
+          </a:fillRef>
+          <a:effectRef idx="3">
+            <a:schemeClr val="accent2"/>
+          </a:effectRef>
+          <a:fontRef idx="minor">
+            <a:schemeClr val="lt1"/>
+          </a:fontRef>
+        </p:style>
+        <p:txBody>
+          <a:bodyPr rtlCol="0" anchor="ctr"/>
+          <a:lstStyle/>
+          <a:p>
+            <a:pPr algn="ctr"/>
+            <a:r>
+              <a:rPr lang="en-US" altLang="ja-JP" sz="2800" b="1" dirty="0" smtClean="0"/>
+              <a:t>SIMPLE</a:t>
+            </a:r>
+            <a:endParaRPr kumimoji="1" lang="en-US" altLang="ja-JP" sz="2800" b="1" dirty="0" smtClean="0"/>
+          </a:p>
+          <a:p>
+            <a:pPr algn="ctr"/>
+            <a:r>
+              <a:rPr lang="ja-JP" altLang="en-US" sz="2800" b="1" dirty="0"/>
+              <a:t>コード</a:t>
+            </a:r>
+            <a:endParaRPr kumimoji="1" lang="ja-JP" altLang="en-US" sz="2800" b="1" dirty="0"/>
+          </a:p>
+        </p:txBody>
+      </p:sp>
+    </p:spTree>
+    <p:extLst>
+      <p:ext uri="{BB962C8B-B14F-4D97-AF65-F5344CB8AC3E}">
+        <p14:creationId xmlns:p14="http://schemas.microsoft.com/office/powerpoint/2010/main" val="2900545820"/>
+      </p:ext>
+    </p:extLst>
+  </p:cSld>
+  <p:clrMapOvr>
+    <a:masterClrMapping/>
+  </p:clrMapOvr>
+  <p:timing>
+    <p:tnLst>
+      <p:par>
+        <p:cTn id="1" dur="indefinite" restart="never" nodeType="tmRoot"/>
+      </p:par>
+    </p:tnLst>
+  </p:timing>
+</p:sld>
+</file>
+
+<file path=ppt/slides/slide11.xml><?xml version="1.0" encoding="utf-8"?>
 <p:sld xmlns:a="http://schemas.openxmlformats.org/drawingml/2006/main" xmlns:r="http://schemas.openxmlformats.org/officeDocument/2006/relationships" xmlns:p="http://schemas.openxmlformats.org/presentationml/2006/main">
   <p:cSld>
     <p:spTree>
@@ -4484,6 +5047,13 @@
   <p:clrMapOvr>
     <a:masterClrMapping/>
   </p:clrMapOvr>
+  <p:timing>
+    <p:tnLst>
+      <p:par>
+        <p:cTn id="1" dur="indefinite" restart="never" nodeType="tmRoot"/>
+      </p:par>
+    </p:tnLst>
+  </p:timing>
 </p:sld>
 </file>
 
@@ -4806,6 +5376,13 @@
   <p:clrMapOvr>
     <a:masterClrMapping/>
   </p:clrMapOvr>
+  <p:timing>
+    <p:tnLst>
+      <p:par>
+        <p:cTn id="1" dur="indefinite" restart="never" nodeType="tmRoot"/>
+      </p:par>
+    </p:tnLst>
+  </p:timing>
 </p:sld>
 </file>
 
@@ -5137,6 +5714,13 @@
   <p:clrMapOvr>
     <a:masterClrMapping/>
   </p:clrMapOvr>
+  <p:timing>
+    <p:tnLst>
+      <p:par>
+        <p:cTn id="1" dur="indefinite" restart="never" nodeType="tmRoot"/>
+      </p:par>
+    </p:tnLst>
+  </p:timing>
 </p:sld>
 </file>
 
@@ -5645,6 +6229,13 @@
   <p:clrMapOvr>
     <a:masterClrMapping/>
   </p:clrMapOvr>
+  <p:timing>
+    <p:tnLst>
+      <p:par>
+        <p:cTn id="1" dur="indefinite" restart="never" nodeType="tmRoot"/>
+      </p:par>
+    </p:tnLst>
+  </p:timing>
 </p:sld>
 </file>
 
@@ -5682,7 +6273,7 @@
           <a:p>
             <a:r>
               <a:rPr kumimoji="1" lang="ja-JP" altLang="en-US" dirty="0" smtClean="0"/>
-              <a:t>これまでの意味論を比較する</a:t>
+              <a:t>コンパイルのこと？</a:t>
             </a:r>
             <a:endParaRPr kumimoji="1" lang="ja-JP" altLang="en-US" dirty="0"/>
           </a:p>
@@ -5700,9 +6291,7 @@
         </p:nvSpPr>
         <p:spPr/>
         <p:txBody>
-          <a:bodyPr>
-            <a:normAutofit/>
-          </a:bodyPr>
+          <a:bodyPr/>
           <a:lstStyle/>
           <a:p>
             <a:pPr marL="0" indent="0">
@@ -5710,79 +6299,9 @@
             </a:pPr>
             <a:r>
               <a:rPr kumimoji="1" lang="ja-JP" altLang="en-US" dirty="0" smtClean="0"/>
-              <a:t>３つの意味論を見てきた</a:t>
-            </a:r>
-            <a:r>
-              <a:rPr lang="ja-JP" altLang="en-US" dirty="0" smtClean="0"/>
-              <a:t>けど</a:t>
-            </a:r>
-            <a:r>
-              <a:rPr lang="ja-JP" altLang="en-US" dirty="0"/>
-              <a:t>、</a:t>
-            </a:r>
-            <a:r>
-              <a:rPr lang="ja-JP" altLang="en-US" dirty="0" smtClean="0"/>
-              <a:t>どう違うの？</a:t>
+              <a:t>コンパイル</a:t>
             </a:r>
             <a:endParaRPr kumimoji="1" lang="en-US" altLang="ja-JP" dirty="0" smtClean="0"/>
-          </a:p>
-          <a:p>
-            <a:pPr marL="0" indent="0">
-              <a:buNone/>
-            </a:pPr>
-            <a:r>
-              <a:rPr kumimoji="1" lang="ja-JP" altLang="en-US" dirty="0" smtClean="0"/>
-              <a:t>　</a:t>
-            </a:r>
-            <a:r>
-              <a:rPr kumimoji="1" lang="en-US" altLang="ja-JP" dirty="0" smtClean="0"/>
-              <a:t>	</a:t>
-            </a:r>
-            <a:r>
-              <a:rPr kumimoji="1" lang="ja-JP" altLang="en-US" dirty="0" smtClean="0"/>
-              <a:t>⇛</a:t>
-            </a:r>
-            <a:r>
-              <a:rPr kumimoji="1" lang="en-US" altLang="ja-JP" dirty="0" smtClean="0">
-                <a:solidFill>
-                  <a:srgbClr val="FF0000"/>
-                </a:solidFill>
-              </a:rPr>
-              <a:t>While</a:t>
-            </a:r>
-            <a:r>
-              <a:rPr kumimoji="1" lang="ja-JP" altLang="en-US" dirty="0" smtClean="0">
-                <a:solidFill>
-                  <a:srgbClr val="FF0000"/>
-                </a:solidFill>
-              </a:rPr>
-              <a:t>文</a:t>
-            </a:r>
-            <a:r>
-              <a:rPr kumimoji="1" lang="ja-JP" altLang="en-US" dirty="0" smtClean="0"/>
-              <a:t>を比べるとわかりやすい</a:t>
-            </a:r>
-            <a:endParaRPr kumimoji="1" lang="en-US" altLang="ja-JP" dirty="0" smtClean="0"/>
-          </a:p>
-          <a:p>
-            <a:pPr marL="0" indent="0">
-              <a:buNone/>
-            </a:pPr>
-            <a:endParaRPr lang="en-US" altLang="ja-JP" dirty="0" smtClean="0"/>
-          </a:p>
-          <a:p>
-            <a:pPr marL="0" indent="0">
-              <a:buNone/>
-            </a:pPr>
-            <a:r>
-              <a:rPr lang="en-US" altLang="ja-JP" dirty="0" smtClean="0"/>
-              <a:t>While</a:t>
-            </a:r>
-            <a:r>
-              <a:rPr lang="ja-JP" altLang="en-US" dirty="0" smtClean="0"/>
-              <a:t>クラス以下のメソッドを見てみる</a:t>
-            </a:r>
-            <a:endParaRPr lang="en-US" altLang="ja-JP" dirty="0" smtClean="0"/>
           </a:p>
           <a:p>
             <a:pPr marL="0" indent="0">
@@ -5793,88 +6312,160 @@
               <a:t>	</a:t>
             </a:r>
             <a:r>
-              <a:rPr lang="ja-JP" altLang="en-US" sz="2800" dirty="0" smtClean="0"/>
-              <a:t>・</a:t>
-            </a:r>
-            <a:r>
-              <a:rPr lang="en-US" altLang="ja-JP" sz="2800" dirty="0" smtClean="0"/>
-              <a:t>reduce(</a:t>
-            </a:r>
-            <a:r>
-              <a:rPr lang="ja-JP" altLang="en-US" sz="2800" dirty="0" smtClean="0"/>
-              <a:t>スモールステップ意味論</a:t>
-            </a:r>
-            <a:r>
-              <a:rPr lang="en-US" altLang="ja-JP" sz="2800" dirty="0" smtClean="0"/>
+              <a:rPr lang="ja-JP" altLang="en-US" dirty="0" smtClean="0"/>
+              <a:t>→　機械語やバイトコード</a:t>
+            </a:r>
+            <a:endParaRPr lang="en-US" altLang="ja-JP" dirty="0" smtClean="0"/>
+          </a:p>
+          <a:p>
+            <a:pPr marL="0" indent="0">
+              <a:buNone/>
+            </a:pPr>
+            <a:endParaRPr kumimoji="1" lang="en-US" altLang="ja-JP" dirty="0"/>
+          </a:p>
+          <a:p>
+            <a:pPr marL="0" indent="0">
+              <a:buNone/>
+            </a:pPr>
+            <a:r>
+              <a:rPr kumimoji="1" lang="ja-JP" altLang="en-US" dirty="0" smtClean="0"/>
+              <a:t>表示的意味論</a:t>
+            </a:r>
+            <a:endParaRPr kumimoji="1" lang="en-US" altLang="ja-JP" dirty="0" smtClean="0"/>
+          </a:p>
+          <a:p>
+            <a:pPr marL="0" indent="0">
+              <a:buNone/>
+            </a:pPr>
+            <a:r>
+              <a:rPr lang="en-US" altLang="ja-JP" dirty="0"/>
+              <a:t>	</a:t>
+            </a:r>
+            <a:r>
+              <a:rPr lang="ja-JP" altLang="en-US" dirty="0" smtClean="0"/>
+              <a:t>→　数学的オブジェクト</a:t>
+            </a:r>
+            <a:endParaRPr lang="en-US" altLang="ja-JP" dirty="0" smtClean="0"/>
+          </a:p>
+          <a:p>
+            <a:pPr marL="0" indent="0">
+              <a:buNone/>
+            </a:pPr>
+            <a:r>
+              <a:rPr lang="en-US" altLang="ja-JP" dirty="0"/>
+              <a:t>	</a:t>
+            </a:r>
+            <a:r>
+              <a:rPr lang="ja-JP" altLang="en-US" dirty="0"/>
+              <a:t> </a:t>
+            </a:r>
+            <a:r>
+              <a:rPr lang="ja-JP" altLang="en-US" dirty="0" smtClean="0"/>
+              <a:t>      （数学的形式</a:t>
+            </a:r>
+            <a:r>
+              <a:rPr lang="ja-JP" altLang="en-US" u="sng" dirty="0" smtClean="0"/>
+              <a:t>言語</a:t>
+            </a:r>
+            <a:r>
+              <a:rPr lang="en-US" altLang="ja-JP" dirty="0" smtClean="0"/>
               <a:t>)</a:t>
             </a:r>
           </a:p>
-          <a:p>
-            <a:pPr marL="0" indent="0">
-              <a:buNone/>
-            </a:pPr>
-            <a:r>
-              <a:rPr lang="en-US" altLang="ja-JP" sz="2800" dirty="0"/>
-              <a:t>	</a:t>
-            </a:r>
-            <a:r>
-              <a:rPr lang="ja-JP" altLang="en-US" sz="2800" dirty="0" smtClean="0"/>
-              <a:t>・</a:t>
-            </a:r>
-            <a:r>
-              <a:rPr lang="en-US" altLang="ja-JP" sz="2800" dirty="0" smtClean="0"/>
-              <a:t>evaluate(</a:t>
-            </a:r>
-            <a:r>
-              <a:rPr lang="ja-JP" altLang="en-US" sz="2800" dirty="0" smtClean="0"/>
-              <a:t>ビッグステップ意味論</a:t>
-            </a:r>
-            <a:r>
-              <a:rPr lang="en-US" altLang="ja-JP" sz="2800" dirty="0" smtClean="0"/>
-              <a:t>)</a:t>
-            </a:r>
-          </a:p>
-          <a:p>
-            <a:pPr marL="0" indent="0">
-              <a:buNone/>
-            </a:pPr>
-            <a:r>
-              <a:rPr lang="en-US" altLang="ja-JP" sz="2800" dirty="0"/>
-              <a:t>	</a:t>
-            </a:r>
-            <a:r>
-              <a:rPr lang="ja-JP" altLang="en-US" sz="2800" dirty="0" smtClean="0"/>
-              <a:t>・</a:t>
-            </a:r>
-            <a:r>
-              <a:rPr lang="en-US" altLang="ja-JP" sz="2800" dirty="0" err="1" smtClean="0"/>
-              <a:t>to_ruby</a:t>
-            </a:r>
-            <a:r>
-              <a:rPr lang="en-US" altLang="ja-JP" sz="2800" dirty="0" smtClean="0"/>
-              <a:t>(</a:t>
-            </a:r>
-            <a:r>
-              <a:rPr lang="ja-JP" altLang="en-US" sz="2800" dirty="0" smtClean="0"/>
-              <a:t>表示的意味論</a:t>
-            </a:r>
-            <a:r>
-              <a:rPr lang="en-US" altLang="ja-JP" sz="2800" dirty="0" smtClean="0"/>
-              <a:t>)</a:t>
-            </a:r>
-          </a:p>
-          <a:p>
-            <a:pPr marL="0" indent="0">
-              <a:buNone/>
-            </a:pPr>
-            <a:endParaRPr lang="en-US" altLang="ja-JP" dirty="0"/>
+        </p:txBody>
+      </p:sp>
+      <p:sp>
+        <p:nvSpPr>
+          <p:cNvPr id="4" name="角丸四角形 3"/>
+          <p:cNvSpPr/>
+          <p:nvPr/>
+        </p:nvSpPr>
+        <p:spPr>
+          <a:xfrm>
+            <a:off x="6084916" y="1844824"/>
+            <a:ext cx="2735556" cy="1224136"/>
+          </a:xfrm>
+          <a:prstGeom prst="roundRect">
+            <a:avLst/>
+          </a:prstGeom>
+        </p:spPr>
+        <p:style>
+          <a:lnRef idx="0">
+            <a:schemeClr val="accent1"/>
+          </a:lnRef>
+          <a:fillRef idx="3">
+            <a:schemeClr val="accent1"/>
+          </a:fillRef>
+          <a:effectRef idx="3">
+            <a:schemeClr val="accent1"/>
+          </a:effectRef>
+          <a:fontRef idx="minor">
+            <a:schemeClr val="lt1"/>
+          </a:fontRef>
+        </p:style>
+        <p:txBody>
+          <a:bodyPr rtlCol="0" anchor="ctr"/>
+          <a:lstStyle/>
+          <a:p>
+            <a:pPr algn="ctr"/>
+            <a:r>
+              <a:rPr kumimoji="1" lang="ja-JP" altLang="en-US" sz="3200" dirty="0" smtClean="0"/>
+              <a:t>機械のため</a:t>
+            </a:r>
+            <a:endParaRPr kumimoji="1" lang="ja-JP" altLang="en-US" dirty="0"/>
+          </a:p>
+        </p:txBody>
+      </p:sp>
+      <p:sp>
+        <p:nvSpPr>
+          <p:cNvPr id="5" name="角丸四角形 4"/>
+          <p:cNvSpPr/>
+          <p:nvPr/>
+        </p:nvSpPr>
+        <p:spPr>
+          <a:xfrm>
+            <a:off x="6084168" y="3933056"/>
+            <a:ext cx="2736304" cy="1224136"/>
+          </a:xfrm>
+          <a:prstGeom prst="roundRect">
+            <a:avLst/>
+          </a:prstGeom>
+        </p:spPr>
+        <p:style>
+          <a:lnRef idx="0">
+            <a:schemeClr val="accent1"/>
+          </a:lnRef>
+          <a:fillRef idx="3">
+            <a:schemeClr val="accent1"/>
+          </a:fillRef>
+          <a:effectRef idx="3">
+            <a:schemeClr val="accent1"/>
+          </a:effectRef>
+          <a:fontRef idx="minor">
+            <a:schemeClr val="lt1"/>
+          </a:fontRef>
+        </p:style>
+        <p:txBody>
+          <a:bodyPr rtlCol="0" anchor="ctr"/>
+          <a:lstStyle/>
+          <a:p>
+            <a:pPr algn="ctr"/>
+            <a:r>
+              <a:rPr lang="ja-JP" altLang="en-US" sz="3200" dirty="0"/>
+              <a:t>他</a:t>
+            </a:r>
+            <a:r>
+              <a:rPr kumimoji="1" lang="ja-JP" altLang="en-US" sz="3200" dirty="0" smtClean="0"/>
+              <a:t>言語のため</a:t>
+            </a:r>
+            <a:endParaRPr kumimoji="1" lang="ja-JP" altLang="en-US" dirty="0"/>
           </a:p>
         </p:txBody>
       </p:sp>
     </p:spTree>
     <p:extLst>
       <p:ext uri="{BB962C8B-B14F-4D97-AF65-F5344CB8AC3E}">
-        <p14:creationId xmlns:p14="http://schemas.microsoft.com/office/powerpoint/2010/main" val="1906930657"/>
+        <p14:creationId xmlns:p14="http://schemas.microsoft.com/office/powerpoint/2010/main" val="3115458840"/>
       </p:ext>
     </p:extLst>
   </p:cSld>
@@ -5903,6 +6494,29 @@
       </p:grpSpPr>
       <p:sp>
         <p:nvSpPr>
+          <p:cNvPr id="2" name="タイトル 1"/>
+          <p:cNvSpPr>
+            <a:spLocks noGrp="1"/>
+          </p:cNvSpPr>
+          <p:nvPr>
+            <p:ph type="title"/>
+          </p:nvPr>
+        </p:nvSpPr>
+        <p:spPr/>
+        <p:txBody>
+          <a:bodyPr/>
+          <a:lstStyle/>
+          <a:p>
+            <a:r>
+              <a:rPr kumimoji="1" lang="ja-JP" altLang="en-US" dirty="0" smtClean="0"/>
+              <a:t>これまでの意味論を比較する</a:t>
+            </a:r>
+            <a:endParaRPr kumimoji="1" lang="ja-JP" altLang="en-US" dirty="0"/>
+          </a:p>
+        </p:txBody>
+      </p:sp>
+      <p:sp>
+        <p:nvSpPr>
           <p:cNvPr id="3" name="コンテンツ プレースホルダー 2"/>
           <p:cNvSpPr>
             <a:spLocks noGrp="1"/>
@@ -5911,161 +6525,116 @@
             <p:ph idx="1"/>
           </p:nvPr>
         </p:nvSpPr>
-        <p:spPr>
-          <a:xfrm>
-            <a:off x="457200" y="692696"/>
-            <a:ext cx="8229600" cy="5433467"/>
-          </a:xfrm>
-        </p:spPr>
+        <p:spPr/>
         <p:txBody>
           <a:bodyPr>
-            <a:normAutofit lnSpcReduction="10000"/>
+            <a:normAutofit/>
           </a:bodyPr>
           <a:lstStyle/>
           <a:p>
             <a:pPr marL="0" indent="0">
               <a:buNone/>
             </a:pPr>
-            <a:endParaRPr lang="en-US" altLang="ja-JP" sz="3600" dirty="0" smtClean="0"/>
+            <a:r>
+              <a:rPr kumimoji="1" lang="ja-JP" altLang="en-US" dirty="0" smtClean="0"/>
+              <a:t>３つの意味論を見てきた</a:t>
+            </a:r>
+            <a:r>
+              <a:rPr lang="ja-JP" altLang="en-US" dirty="0" smtClean="0"/>
+              <a:t>けど</a:t>
+            </a:r>
+            <a:r>
+              <a:rPr lang="ja-JP" altLang="en-US" dirty="0"/>
+              <a:t>、</a:t>
+            </a:r>
+            <a:r>
+              <a:rPr lang="ja-JP" altLang="en-US" dirty="0" smtClean="0"/>
+              <a:t>どう違うの？</a:t>
+            </a:r>
+            <a:endParaRPr kumimoji="1" lang="en-US" altLang="ja-JP" dirty="0" smtClean="0"/>
           </a:p>
           <a:p>
             <a:pPr marL="0" indent="0">
               <a:buNone/>
             </a:pPr>
             <a:r>
-              <a:rPr lang="ja-JP" altLang="en-US" dirty="0" smtClean="0"/>
-              <a:t>スモールステップ意味論</a:t>
-            </a:r>
-            <a:endParaRPr lang="en-US" altLang="ja-JP" sz="2800" dirty="0" smtClean="0"/>
-          </a:p>
-          <a:p>
-            <a:pPr marL="0" indent="0">
-              <a:buNone/>
-            </a:pPr>
-            <a:r>
-              <a:rPr lang="en-US" altLang="ja-JP" sz="2800" dirty="0" err="1" smtClean="0"/>
-              <a:t>def</a:t>
-            </a:r>
-            <a:r>
-              <a:rPr lang="en-US" altLang="ja-JP" sz="2800" dirty="0" smtClean="0"/>
-              <a:t> </a:t>
-            </a:r>
-            <a:r>
-              <a:rPr lang="en-US" altLang="ja-JP" sz="2800" dirty="0"/>
-              <a:t>reduce(environment)</a:t>
-            </a:r>
-          </a:p>
-          <a:p>
-            <a:pPr marL="0" indent="0">
-              <a:buNone/>
-            </a:pPr>
-            <a:r>
-              <a:rPr lang="en-US" altLang="ja-JP" sz="2800" dirty="0"/>
-              <a:t>	[</a:t>
-            </a:r>
-            <a:r>
-              <a:rPr lang="en-US" altLang="ja-JP" sz="2800" dirty="0" err="1"/>
-              <a:t>If.new</a:t>
-            </a:r>
-            <a:r>
-              <a:rPr lang="en-US" altLang="ja-JP" sz="2800" dirty="0"/>
-              <a:t>(condition, </a:t>
-            </a:r>
-            <a:r>
-              <a:rPr lang="en-US" altLang="ja-JP" sz="2800" dirty="0" err="1"/>
-              <a:t>Sequence.new</a:t>
-            </a:r>
-            <a:r>
-              <a:rPr lang="en-US" altLang="ja-JP" sz="2800" dirty="0"/>
-              <a:t>(body, self), 	</a:t>
-            </a:r>
-            <a:r>
-              <a:rPr lang="en-US" altLang="ja-JP" sz="2800" dirty="0" err="1" smtClean="0"/>
-              <a:t>DoNothing.new</a:t>
-            </a:r>
-            <a:r>
-              <a:rPr lang="en-US" altLang="ja-JP" sz="2800" dirty="0"/>
-              <a:t>), environment]</a:t>
-            </a:r>
-          </a:p>
-          <a:p>
-            <a:pPr marL="0" indent="0">
-              <a:buNone/>
-            </a:pPr>
-            <a:r>
-              <a:rPr lang="en-US" altLang="ja-JP" sz="2800" dirty="0" smtClean="0"/>
-              <a:t>end</a:t>
-            </a:r>
-          </a:p>
-          <a:p>
-            <a:pPr marL="0" indent="0">
-              <a:buNone/>
-            </a:pPr>
-            <a:r>
-              <a:rPr lang="en-US" altLang="ja-JP" sz="2800" dirty="0"/>
+              <a:rPr kumimoji="1" lang="ja-JP" altLang="en-US" dirty="0" smtClean="0"/>
+              <a:t>　</a:t>
+            </a:r>
+            <a:r>
+              <a:rPr kumimoji="1" lang="en-US" altLang="ja-JP" dirty="0" smtClean="0"/>
               <a:t>	</a:t>
             </a:r>
-            <a:endParaRPr lang="en-US" altLang="ja-JP" sz="2800" dirty="0" smtClean="0"/>
-          </a:p>
-          <a:p>
-            <a:pPr marL="0" indent="0">
-              <a:buNone/>
-            </a:pPr>
-            <a:r>
-              <a:rPr lang="en-US" altLang="ja-JP" sz="2800" dirty="0"/>
-              <a:t>	</a:t>
-            </a:r>
-            <a:r>
-              <a:rPr lang="ja-JP" altLang="en-US" sz="2800" dirty="0" smtClean="0"/>
-              <a:t>・</a:t>
-            </a:r>
-            <a:r>
-              <a:rPr lang="en-US" altLang="ja-JP" sz="2800" dirty="0"/>
-              <a:t>W</a:t>
-            </a:r>
-            <a:r>
-              <a:rPr lang="en-US" altLang="ja-JP" sz="2800" dirty="0" smtClean="0"/>
-              <a:t>hile</a:t>
-            </a:r>
-            <a:r>
-              <a:rPr lang="ja-JP" altLang="en-US" sz="2800" dirty="0" smtClean="0"/>
-              <a:t>文を</a:t>
-            </a:r>
-            <a:r>
-              <a:rPr lang="en-US" altLang="ja-JP" sz="2800" dirty="0" smtClean="0"/>
-              <a:t>If</a:t>
-            </a:r>
-            <a:r>
-              <a:rPr lang="ja-JP" altLang="en-US" sz="2800" dirty="0" smtClean="0"/>
-              <a:t>文に簡約</a:t>
-            </a:r>
-            <a:endParaRPr lang="en-US" altLang="ja-JP" sz="2800" dirty="0"/>
-          </a:p>
-          <a:p>
-            <a:pPr marL="0" indent="0">
-              <a:buNone/>
-            </a:pPr>
-            <a:r>
-              <a:rPr lang="en-US" altLang="ja-JP" dirty="0" smtClean="0"/>
-              <a:t>	</a:t>
-            </a:r>
-            <a:r>
-              <a:rPr lang="ja-JP" altLang="en-US" sz="2800" dirty="0" smtClean="0"/>
-              <a:t>・ループの</a:t>
-            </a:r>
-            <a:r>
-              <a:rPr lang="ja-JP" altLang="en-US" sz="2800" dirty="0" smtClean="0">
+            <a:r>
+              <a:rPr kumimoji="1" lang="ja-JP" altLang="en-US" dirty="0" smtClean="0"/>
+              <a:t>⇛</a:t>
+            </a:r>
+            <a:r>
+              <a:rPr kumimoji="1" lang="en-US" altLang="ja-JP" dirty="0" smtClean="0">
                 <a:solidFill>
                   <a:srgbClr val="FF0000"/>
                 </a:solidFill>
               </a:rPr>
-              <a:t>一部分</a:t>
+              <a:t>While</a:t>
+            </a:r>
+            <a:r>
+              <a:rPr kumimoji="1" lang="ja-JP" altLang="en-US" dirty="0" smtClean="0">
+                <a:solidFill>
+                  <a:srgbClr val="FF0000"/>
+                </a:solidFill>
+              </a:rPr>
+              <a:t>文</a:t>
+            </a:r>
+            <a:r>
+              <a:rPr kumimoji="1" lang="ja-JP" altLang="en-US" dirty="0" smtClean="0"/>
+              <a:t>を比べるとわかりやすい</a:t>
+            </a:r>
+            <a:endParaRPr kumimoji="1" lang="en-US" altLang="ja-JP" dirty="0" smtClean="0"/>
+          </a:p>
+          <a:p>
+            <a:pPr marL="0" indent="0">
+              <a:buNone/>
+            </a:pPr>
+            <a:endParaRPr lang="en-US" altLang="ja-JP" dirty="0" smtClean="0"/>
+          </a:p>
+          <a:p>
+            <a:pPr marL="0" indent="0">
+              <a:buNone/>
+            </a:pPr>
+            <a:r>
+              <a:rPr lang="en-US" altLang="ja-JP" dirty="0" smtClean="0"/>
+              <a:t>While</a:t>
+            </a:r>
+            <a:r>
+              <a:rPr lang="ja-JP" altLang="en-US" dirty="0" smtClean="0"/>
+              <a:t>クラス以下のメソッドを見てみる</a:t>
+            </a:r>
+            <a:endParaRPr lang="en-US" altLang="ja-JP" dirty="0" smtClean="0"/>
+          </a:p>
+          <a:p>
+            <a:pPr marL="0" indent="0">
+              <a:buNone/>
+            </a:pPr>
+            <a:r>
+              <a:rPr lang="en-US" altLang="ja-JP" dirty="0"/>
+              <a:t>	</a:t>
             </a:r>
             <a:r>
               <a:rPr lang="ja-JP" altLang="en-US" sz="2800" dirty="0" smtClean="0"/>
-              <a:t>の振る舞い</a:t>
-            </a:r>
-            <a:endParaRPr lang="en-US" altLang="ja-JP" sz="2800" dirty="0" smtClean="0"/>
+              <a:t>・</a:t>
+            </a:r>
+            <a:r>
+              <a:rPr lang="en-US" altLang="ja-JP" sz="2800" dirty="0" smtClean="0"/>
+              <a:t>reduce(</a:t>
+            </a:r>
+            <a:r>
+              <a:rPr lang="ja-JP" altLang="en-US" sz="2800" dirty="0" smtClean="0"/>
+              <a:t>スモールステップ意味論</a:t>
+            </a:r>
+            <a:r>
+              <a:rPr lang="en-US" altLang="ja-JP" sz="2800" dirty="0" smtClean="0"/>
+              <a:t>)</a:t>
+            </a:r>
           </a:p>
           <a:p>
             <a:pPr marL="0" indent="0">
@@ -6077,21 +6646,20 @@
             </a:r>
             <a:r>
               <a:rPr lang="ja-JP" altLang="en-US" sz="2800" dirty="0" smtClean="0"/>
-              <a:t>⇛</a:t>
+              <a:t>・</a:t>
             </a:r>
             <a:r>
               <a:rPr lang="en-US" altLang="ja-JP" sz="2800" dirty="0" smtClean="0"/>
-              <a:t>While</a:t>
-            </a:r>
-            <a:r>
-              <a:rPr lang="ja-JP" altLang="en-US" sz="2800" dirty="0"/>
-              <a:t>全体</a:t>
+              <a:t>evaluate(</a:t>
             </a:r>
             <a:r>
               <a:rPr lang="ja-JP" altLang="en-US" sz="2800" dirty="0" smtClean="0"/>
-              <a:t>の振る舞いは簡約手順を</a:t>
-            </a:r>
-            <a:endParaRPr lang="en-US" altLang="ja-JP" sz="2800" dirty="0" smtClean="0"/>
+              <a:t>ビッグステップ意味論</a:t>
+            </a:r>
+            <a:r>
+              <a:rPr lang="en-US" altLang="ja-JP" sz="2800" dirty="0" smtClean="0"/>
+              <a:t>)</a:t>
+            </a:r>
           </a:p>
           <a:p>
             <a:pPr marL="0" indent="0">
@@ -6103,28 +6671,50 @@
             </a:r>
             <a:r>
               <a:rPr lang="ja-JP" altLang="en-US" sz="2800" dirty="0" smtClean="0"/>
-              <a:t>　　すべて追えば分かる</a:t>
-            </a:r>
-            <a:endParaRPr lang="ja-JP" altLang="en-US" sz="2800" dirty="0"/>
+              <a:t>・</a:t>
+            </a:r>
+            <a:r>
+              <a:rPr lang="en-US" altLang="ja-JP" sz="2800" dirty="0" err="1" smtClean="0"/>
+              <a:t>to_ruby</a:t>
+            </a:r>
+            <a:r>
+              <a:rPr lang="en-US" altLang="ja-JP" sz="2800" dirty="0" smtClean="0"/>
+              <a:t>(</a:t>
+            </a:r>
+            <a:r>
+              <a:rPr lang="ja-JP" altLang="en-US" sz="2800" dirty="0" smtClean="0"/>
+              <a:t>表示的意味論</a:t>
+            </a:r>
+            <a:r>
+              <a:rPr lang="en-US" altLang="ja-JP" sz="2800" dirty="0" smtClean="0"/>
+              <a:t>)</a:t>
+            </a:r>
           </a:p>
           <a:p>
             <a:pPr marL="0" indent="0">
               <a:buNone/>
             </a:pPr>
-            <a:endParaRPr kumimoji="1" lang="ja-JP" altLang="en-US" dirty="0"/>
+            <a:endParaRPr lang="en-US" altLang="ja-JP" dirty="0"/>
           </a:p>
         </p:txBody>
       </p:sp>
     </p:spTree>
     <p:extLst>
       <p:ext uri="{BB962C8B-B14F-4D97-AF65-F5344CB8AC3E}">
-        <p14:creationId xmlns:p14="http://schemas.microsoft.com/office/powerpoint/2010/main" val="2866349066"/>
+        <p14:creationId xmlns:p14="http://schemas.microsoft.com/office/powerpoint/2010/main" val="1906930657"/>
       </p:ext>
     </p:extLst>
   </p:cSld>
   <p:clrMapOvr>
     <a:masterClrMapping/>
   </p:clrMapOvr>
+  <p:timing>
+    <p:tnLst>
+      <p:par>
+        <p:cTn id="1" dur="indefinite" restart="never" nodeType="tmRoot"/>
+      </p:par>
+    </p:tnLst>
+  </p:timing>
 </p:sld>
 </file>
 
@@ -6157,24 +6747,30 @@
         </p:nvSpPr>
         <p:spPr>
           <a:xfrm>
-            <a:off x="467544" y="332656"/>
-            <a:ext cx="8229600" cy="6192688"/>
+            <a:off x="457200" y="692696"/>
+            <a:ext cx="8229600" cy="5433467"/>
           </a:xfrm>
         </p:spPr>
         <p:txBody>
           <a:bodyPr>
-            <a:normAutofit/>
+            <a:normAutofit lnSpcReduction="10000"/>
           </a:bodyPr>
           <a:lstStyle/>
           <a:p>
             <a:pPr marL="0" indent="0">
               <a:buNone/>
             </a:pPr>
-            <a:r>
-              <a:rPr kumimoji="1" lang="ja-JP" altLang="en-US" dirty="0" smtClean="0"/>
-              <a:t>ビッグステップ意味論</a:t>
-            </a:r>
-            <a:endParaRPr kumimoji="1" lang="en-US" altLang="ja-JP" dirty="0" smtClean="0"/>
+            <a:endParaRPr lang="en-US" altLang="ja-JP" sz="3600" dirty="0" smtClean="0"/>
+          </a:p>
+          <a:p>
+            <a:pPr marL="0" indent="0">
+              <a:buNone/>
+            </a:pPr>
+            <a:r>
+              <a:rPr lang="ja-JP" altLang="en-US" dirty="0" smtClean="0"/>
+              <a:t>スモールステップ意味論</a:t>
+            </a:r>
+            <a:endParaRPr lang="en-US" altLang="ja-JP" sz="2800" dirty="0" smtClean="0"/>
           </a:p>
           <a:p>
             <a:pPr marL="0" indent="0">
@@ -6190,7 +6786,7 @@
             </a:r>
             <a:r>
               <a:rPr lang="en-US" altLang="ja-JP" sz="2800" dirty="0"/>
-              <a:t>evaluate(environment)</a:t>
+              <a:t>reduce(environment)</a:t>
             </a:r>
           </a:p>
           <a:p>
@@ -6199,20 +6795,51 @@
             </a:pPr>
             <a:r>
               <a:rPr lang="en-US" altLang="ja-JP" sz="2800" dirty="0"/>
-              <a:t> </a:t>
-            </a:r>
+              <a:t>	[</a:t>
+            </a:r>
+            <a:r>
+              <a:rPr lang="en-US" altLang="ja-JP" sz="2800" dirty="0" err="1"/>
+              <a:t>If.new</a:t>
+            </a:r>
+            <a:r>
+              <a:rPr lang="en-US" altLang="ja-JP" sz="2800" dirty="0"/>
+              <a:t>(condition, </a:t>
+            </a:r>
+            <a:r>
+              <a:rPr lang="en-US" altLang="ja-JP" sz="2800" dirty="0" err="1"/>
+              <a:t>Sequence.new</a:t>
+            </a:r>
+            <a:r>
+              <a:rPr lang="en-US" altLang="ja-JP" sz="2800" dirty="0"/>
+              <a:t>(body, self), 	</a:t>
+            </a:r>
+            <a:r>
+              <a:rPr lang="en-US" altLang="ja-JP" sz="2800" dirty="0" err="1" smtClean="0"/>
+              <a:t>DoNothing.new</a:t>
+            </a:r>
+            <a:r>
+              <a:rPr lang="en-US" altLang="ja-JP" sz="2800" dirty="0"/>
+              <a:t>), environment]</a:t>
+            </a:r>
+          </a:p>
+          <a:p>
+            <a:pPr marL="0" indent="0">
+              <a:buNone/>
+            </a:pPr>
             <a:r>
               <a:rPr lang="en-US" altLang="ja-JP" sz="2800" dirty="0" smtClean="0"/>
-              <a:t>	case </a:t>
-            </a:r>
-            <a:r>
-              <a:rPr lang="en-US" altLang="ja-JP" sz="2800" dirty="0" err="1"/>
-              <a:t>condition.evaluate</a:t>
-            </a:r>
+              <a:t>end</a:t>
+            </a:r>
+          </a:p>
+          <a:p>
+            <a:pPr marL="0" indent="0">
+              <a:buNone/>
+            </a:pPr>
             <a:r>
               <a:rPr lang="en-US" altLang="ja-JP" sz="2800" dirty="0"/>
-              <a:t>(environment)</a:t>
-            </a:r>
+              <a:t>	</a:t>
+            </a:r>
+            <a:endParaRPr lang="en-US" altLang="ja-JP" sz="2800" dirty="0" smtClean="0"/>
           </a:p>
           <a:p>
             <a:pPr marL="0" indent="0">
@@ -6220,149 +6847,59 @@
             </a:pPr>
             <a:r>
               <a:rPr lang="en-US" altLang="ja-JP" sz="2800" dirty="0"/>
-              <a:t>      </a:t>
+              <a:t>	</a:t>
+            </a:r>
+            <a:r>
+              <a:rPr lang="ja-JP" altLang="en-US" sz="2800" dirty="0" smtClean="0"/>
+              <a:t>・</a:t>
+            </a:r>
+            <a:r>
+              <a:rPr lang="en-US" altLang="ja-JP" sz="2800" dirty="0"/>
+              <a:t>W</a:t>
             </a:r>
             <a:r>
               <a:rPr lang="en-US" altLang="ja-JP" sz="2800" dirty="0" smtClean="0"/>
+              <a:t>hile</a:t>
+            </a:r>
+            <a:r>
+              <a:rPr lang="ja-JP" altLang="en-US" sz="2800" dirty="0" smtClean="0"/>
+              <a:t>文を</a:t>
+            </a:r>
+            <a:r>
+              <a:rPr lang="en-US" altLang="ja-JP" sz="2800" dirty="0" smtClean="0"/>
+              <a:t>If</a:t>
+            </a:r>
+            <a:r>
+              <a:rPr lang="ja-JP" altLang="en-US" sz="2800" dirty="0" smtClean="0"/>
+              <a:t>文に簡約</a:t>
+            </a:r>
+            <a:endParaRPr lang="en-US" altLang="ja-JP" sz="2800" dirty="0"/>
+          </a:p>
+          <a:p>
+            <a:pPr marL="0" indent="0">
+              <a:buNone/>
+            </a:pPr>
+            <a:r>
+              <a:rPr lang="en-US" altLang="ja-JP" dirty="0" smtClean="0"/>
               <a:t>	</a:t>
             </a:r>
             <a:r>
               <a:rPr lang="ja-JP" altLang="en-US" sz="2800" dirty="0" smtClean="0"/>
-              <a:t>　</a:t>
-            </a:r>
-            <a:r>
-              <a:rPr lang="en-US" altLang="ja-JP" sz="2800" dirty="0" smtClean="0"/>
-              <a:t>when </a:t>
-            </a:r>
-            <a:r>
-              <a:rPr lang="en-US" altLang="ja-JP" sz="2800" dirty="0" err="1"/>
-              <a:t>Boolean.new</a:t>
-            </a:r>
-            <a:r>
-              <a:rPr lang="en-US" altLang="ja-JP" sz="2800" dirty="0"/>
-              <a:t>(true)</a:t>
-            </a:r>
-          </a:p>
-          <a:p>
-            <a:pPr marL="0" indent="0">
-              <a:buNone/>
-            </a:pPr>
-            <a:r>
-              <a:rPr lang="en-US" altLang="ja-JP" sz="2800" dirty="0"/>
-              <a:t>        </a:t>
-            </a:r>
-            <a:r>
-              <a:rPr lang="en-US" altLang="ja-JP" sz="2800" dirty="0" smtClean="0"/>
-              <a:t>		evaluate(</a:t>
-            </a:r>
-            <a:r>
-              <a:rPr lang="en-US" altLang="ja-JP" sz="2800" dirty="0" err="1" smtClean="0"/>
-              <a:t>body.evaluate</a:t>
-            </a:r>
-            <a:r>
-              <a:rPr lang="en-US" altLang="ja-JP" sz="2800" dirty="0" smtClean="0"/>
-              <a:t>(environment</a:t>
-            </a:r>
-            <a:r>
-              <a:rPr lang="en-US" altLang="ja-JP" sz="2800" dirty="0"/>
-              <a:t>))</a:t>
-            </a:r>
-          </a:p>
-          <a:p>
-            <a:pPr marL="0" indent="0">
-              <a:buNone/>
-            </a:pPr>
-            <a:r>
-              <a:rPr lang="en-US" altLang="ja-JP" sz="2800" dirty="0"/>
-              <a:t>      </a:t>
-            </a:r>
-            <a:r>
-              <a:rPr lang="en-US" altLang="ja-JP" sz="2800" dirty="0" smtClean="0"/>
-              <a:t>	</a:t>
-            </a:r>
-            <a:r>
-              <a:rPr lang="ja-JP" altLang="en-US" sz="2800" dirty="0" smtClean="0"/>
-              <a:t>　</a:t>
-            </a:r>
-            <a:r>
-              <a:rPr lang="en-US" altLang="ja-JP" sz="2800" dirty="0" smtClean="0"/>
-              <a:t>when </a:t>
-            </a:r>
-            <a:r>
-              <a:rPr lang="en-US" altLang="ja-JP" sz="2800" dirty="0" err="1"/>
-              <a:t>Boolean.new</a:t>
-            </a:r>
-            <a:r>
-              <a:rPr lang="en-US" altLang="ja-JP" sz="2800" dirty="0"/>
-              <a:t>(false)</a:t>
-            </a:r>
-          </a:p>
-          <a:p>
-            <a:pPr marL="0" indent="0">
-              <a:buNone/>
-            </a:pPr>
-            <a:r>
-              <a:rPr lang="en-US" altLang="ja-JP" sz="2800" dirty="0"/>
-              <a:t>        </a:t>
-            </a:r>
-            <a:r>
-              <a:rPr lang="en-US" altLang="ja-JP" sz="2800" dirty="0" smtClean="0"/>
-              <a:t>		environment</a:t>
-            </a:r>
-            <a:endParaRPr lang="en-US" altLang="ja-JP" sz="2800" dirty="0"/>
-          </a:p>
-          <a:p>
-            <a:pPr marL="0" indent="0">
-              <a:buNone/>
-            </a:pPr>
-            <a:r>
-              <a:rPr lang="en-US" altLang="ja-JP" sz="2800" dirty="0"/>
-              <a:t>    </a:t>
-            </a:r>
-            <a:r>
-              <a:rPr lang="en-US" altLang="ja-JP" sz="2800" dirty="0" smtClean="0"/>
-              <a:t>	end</a:t>
-            </a:r>
-            <a:endParaRPr lang="en-US" altLang="ja-JP" sz="2800" dirty="0"/>
-          </a:p>
-          <a:p>
-            <a:pPr marL="0" indent="0">
-              <a:buNone/>
-            </a:pPr>
-            <a:r>
-              <a:rPr lang="en-US" altLang="ja-JP" sz="2800" dirty="0"/>
-              <a:t>e</a:t>
-            </a:r>
-            <a:r>
-              <a:rPr lang="en-US" altLang="ja-JP" sz="2800" dirty="0" smtClean="0"/>
-              <a:t>nd</a:t>
-            </a:r>
-          </a:p>
-          <a:p>
-            <a:pPr marL="0" indent="0">
-              <a:buNone/>
-            </a:pPr>
-            <a:r>
-              <a:rPr kumimoji="1" lang="en-US" altLang="ja-JP" sz="2800" dirty="0" smtClean="0"/>
-              <a:t>	</a:t>
-            </a:r>
-            <a:r>
-              <a:rPr kumimoji="1" lang="ja-JP" altLang="en-US" sz="2800" dirty="0" smtClean="0"/>
-              <a:t>・自身を</a:t>
-            </a:r>
-            <a:r>
-              <a:rPr kumimoji="1" lang="ja-JP" altLang="en-US" sz="2800" dirty="0" smtClean="0">
+              <a:t>・ループの</a:t>
+            </a:r>
+            <a:r>
+              <a:rPr lang="ja-JP" altLang="en-US" sz="2800" dirty="0" smtClean="0">
                 <a:solidFill>
                   <a:srgbClr val="FF0000"/>
                 </a:solidFill>
               </a:rPr>
-              <a:t>再帰</a:t>
-            </a:r>
-            <a:r>
-              <a:rPr kumimoji="1" lang="ja-JP" altLang="en-US" sz="2800" dirty="0" smtClean="0"/>
-              <a:t>呼び出ししてループ</a:t>
-            </a:r>
-            <a:endParaRPr kumimoji="1" lang="en-US" altLang="ja-JP" sz="2800" dirty="0" smtClean="0"/>
+              <a:t>一部分</a:t>
+            </a:r>
+            <a:r>
+              <a:rPr lang="ja-JP" altLang="en-US" sz="2800" dirty="0" smtClean="0"/>
+              <a:t>の振る舞い</a:t>
+            </a:r>
+            <a:endParaRPr lang="en-US" altLang="ja-JP" sz="2800" dirty="0" smtClean="0"/>
           </a:p>
           <a:p>
             <a:pPr marL="0" indent="0">
@@ -6374,22 +6911,61 @@
             </a:r>
             <a:r>
               <a:rPr lang="ja-JP" altLang="en-US" sz="2800" dirty="0" smtClean="0"/>
-              <a:t>・ループ全体の振る舞い</a:t>
-            </a:r>
-            <a:endParaRPr kumimoji="1" lang="ja-JP" altLang="en-US" sz="2800" dirty="0"/>
+              <a:t>⇛</a:t>
+            </a:r>
+            <a:r>
+              <a:rPr lang="en-US" altLang="ja-JP" sz="2800" dirty="0" smtClean="0"/>
+              <a:t>While</a:t>
+            </a:r>
+            <a:r>
+              <a:rPr lang="ja-JP" altLang="en-US" sz="2800" dirty="0"/>
+              <a:t>全体</a:t>
+            </a:r>
+            <a:r>
+              <a:rPr lang="ja-JP" altLang="en-US" sz="2800" dirty="0" smtClean="0"/>
+              <a:t>の振る舞いは簡約手順を</a:t>
+            </a:r>
+            <a:endParaRPr lang="en-US" altLang="ja-JP" sz="2800" dirty="0" smtClean="0"/>
+          </a:p>
+          <a:p>
+            <a:pPr marL="0" indent="0">
+              <a:buNone/>
+            </a:pPr>
+            <a:r>
+              <a:rPr lang="en-US" altLang="ja-JP" sz="2800" dirty="0"/>
+              <a:t>	</a:t>
+            </a:r>
+            <a:r>
+              <a:rPr lang="ja-JP" altLang="en-US" sz="2800" dirty="0" smtClean="0"/>
+              <a:t>　　すべて追えば分かる</a:t>
+            </a:r>
+            <a:endParaRPr lang="ja-JP" altLang="en-US" sz="2800" dirty="0"/>
+          </a:p>
+          <a:p>
+            <a:pPr marL="0" indent="0">
+              <a:buNone/>
+            </a:pPr>
+            <a:endParaRPr kumimoji="1" lang="ja-JP" altLang="en-US" dirty="0"/>
           </a:p>
         </p:txBody>
       </p:sp>
     </p:spTree>
     <p:extLst>
       <p:ext uri="{BB962C8B-B14F-4D97-AF65-F5344CB8AC3E}">
-        <p14:creationId xmlns:p14="http://schemas.microsoft.com/office/powerpoint/2010/main" val="1426820628"/>
+        <p14:creationId xmlns:p14="http://schemas.microsoft.com/office/powerpoint/2010/main" val="2866349066"/>
       </p:ext>
     </p:extLst>
   </p:cSld>
   <p:clrMapOvr>
     <a:masterClrMapping/>
   </p:clrMapOvr>
+  <p:timing>
+    <p:tnLst>
+      <p:par>
+        <p:cTn id="1" dur="indefinite" restart="never" nodeType="tmRoot"/>
+      </p:par>
+    </p:tnLst>
+  </p:timing>
 </p:sld>
 </file>
 
@@ -6422,13 +6998,13 @@
         </p:nvSpPr>
         <p:spPr>
           <a:xfrm>
-            <a:off x="457200" y="692696"/>
-            <a:ext cx="8229600" cy="5433467"/>
+            <a:off x="467544" y="332656"/>
+            <a:ext cx="8229600" cy="6192688"/>
           </a:xfrm>
         </p:spPr>
         <p:txBody>
           <a:bodyPr>
-            <a:normAutofit lnSpcReduction="10000"/>
+            <a:normAutofit/>
           </a:bodyPr>
           <a:lstStyle/>
           <a:p>
@@ -6437,7 +7013,7 @@
             </a:pPr>
             <a:r>
               <a:rPr kumimoji="1" lang="ja-JP" altLang="en-US" dirty="0" smtClean="0"/>
-              <a:t>表示的意味論</a:t>
+              <a:t>ビッグステップ意味論</a:t>
             </a:r>
             <a:endParaRPr kumimoji="1" lang="en-US" altLang="ja-JP" dirty="0" smtClean="0"/>
           </a:p>
@@ -6454,8 +7030,125 @@
               <a:t> </a:t>
             </a:r>
             <a:r>
+              <a:rPr lang="en-US" altLang="ja-JP" sz="2800" dirty="0"/>
+              <a:t>evaluate(environment)</a:t>
+            </a:r>
+          </a:p>
+          <a:p>
+            <a:pPr marL="0" indent="0">
+              <a:buNone/>
+            </a:pPr>
+            <a:r>
+              <a:rPr lang="en-US" altLang="ja-JP" sz="2800" dirty="0"/>
+              <a:t> </a:t>
+            </a:r>
+            <a:r>
+              <a:rPr lang="en-US" altLang="ja-JP" sz="2800" dirty="0" smtClean="0"/>
+              <a:t>	case </a:t>
+            </a:r>
+            <a:r>
               <a:rPr lang="en-US" altLang="ja-JP" sz="2800" dirty="0" err="1"/>
-              <a:t>to_ruby</a:t>
+              <a:t>condition.evaluate</a:t>
+            </a:r>
+            <a:r>
+              <a:rPr lang="en-US" altLang="ja-JP" sz="2800" dirty="0"/>
+              <a:t>(environment)</a:t>
+            </a:r>
+          </a:p>
+          <a:p>
+            <a:pPr marL="0" indent="0">
+              <a:buNone/>
+            </a:pPr>
+            <a:r>
+              <a:rPr lang="en-US" altLang="ja-JP" sz="2800" dirty="0"/>
+              <a:t>      </a:t>
+            </a:r>
+            <a:r>
+              <a:rPr lang="en-US" altLang="ja-JP" sz="2800" dirty="0" smtClean="0"/>
+              <a:t>	</a:t>
+            </a:r>
+            <a:r>
+              <a:rPr lang="ja-JP" altLang="en-US" sz="2800" dirty="0" smtClean="0"/>
+              <a:t>　</a:t>
+            </a:r>
+            <a:r>
+              <a:rPr lang="en-US" altLang="ja-JP" sz="2800" dirty="0" smtClean="0"/>
+              <a:t>when </a:t>
+            </a:r>
+            <a:r>
+              <a:rPr lang="en-US" altLang="ja-JP" sz="2800" dirty="0" err="1"/>
+              <a:t>Boolean.new</a:t>
+            </a:r>
+            <a:r>
+              <a:rPr lang="en-US" altLang="ja-JP" sz="2800" dirty="0"/>
+              <a:t>(true)</a:t>
+            </a:r>
+          </a:p>
+          <a:p>
+            <a:pPr marL="0" indent="0">
+              <a:buNone/>
+            </a:pPr>
+            <a:r>
+              <a:rPr lang="en-US" altLang="ja-JP" sz="2800" dirty="0"/>
+              <a:t>        </a:t>
+            </a:r>
+            <a:r>
+              <a:rPr lang="en-US" altLang="ja-JP" sz="2800" dirty="0" smtClean="0"/>
+              <a:t>		evaluate(</a:t>
+            </a:r>
+            <a:r>
+              <a:rPr lang="en-US" altLang="ja-JP" sz="2800" dirty="0" err="1" smtClean="0"/>
+              <a:t>body.evaluate</a:t>
+            </a:r>
+            <a:r>
+              <a:rPr lang="en-US" altLang="ja-JP" sz="2800" dirty="0" smtClean="0"/>
+              <a:t>(environment</a:t>
+            </a:r>
+            <a:r>
+              <a:rPr lang="en-US" altLang="ja-JP" sz="2800" dirty="0"/>
+              <a:t>))</a:t>
+            </a:r>
+          </a:p>
+          <a:p>
+            <a:pPr marL="0" indent="0">
+              <a:buNone/>
+            </a:pPr>
+            <a:r>
+              <a:rPr lang="en-US" altLang="ja-JP" sz="2800" dirty="0"/>
+              <a:t>      </a:t>
+            </a:r>
+            <a:r>
+              <a:rPr lang="en-US" altLang="ja-JP" sz="2800" dirty="0" smtClean="0"/>
+              <a:t>	</a:t>
+            </a:r>
+            <a:r>
+              <a:rPr lang="ja-JP" altLang="en-US" sz="2800" dirty="0" smtClean="0"/>
+              <a:t>　</a:t>
+            </a:r>
+            <a:r>
+              <a:rPr lang="en-US" altLang="ja-JP" sz="2800" dirty="0" smtClean="0"/>
+              <a:t>when </a:t>
+            </a:r>
+            <a:r>
+              <a:rPr lang="en-US" altLang="ja-JP" sz="2800" dirty="0" err="1"/>
+              <a:t>Boolean.new</a:t>
+            </a:r>
+            <a:r>
+              <a:rPr lang="en-US" altLang="ja-JP" sz="2800" dirty="0"/>
+              <a:t>(false)</a:t>
+            </a:r>
+          </a:p>
+          <a:p>
+            <a:pPr marL="0" indent="0">
+              <a:buNone/>
+            </a:pPr>
+            <a:r>
+              <a:rPr lang="en-US" altLang="ja-JP" sz="2800" dirty="0"/>
+              <a:t>        </a:t>
+            </a:r>
+            <a:r>
+              <a:rPr lang="en-US" altLang="ja-JP" sz="2800" dirty="0" smtClean="0"/>
+              <a:t>		environment</a:t>
             </a:r>
             <a:endParaRPr lang="en-US" altLang="ja-JP" sz="2800" dirty="0"/>
           </a:p>
@@ -6464,90 +7157,14 @@
               <a:buNone/>
             </a:pPr>
             <a:r>
+              <a:rPr lang="en-US" altLang="ja-JP" sz="2800" dirty="0"/>
+              <a:t>    </a:t>
+            </a:r>
+            <a:r>
               <a:rPr lang="en-US" altLang="ja-JP" sz="2800" dirty="0" smtClean="0"/>
-              <a:t>	"-&gt; </a:t>
-            </a:r>
-            <a:r>
-              <a:rPr lang="en-US" altLang="ja-JP" sz="2800" dirty="0"/>
-              <a:t>e {" +</a:t>
-            </a:r>
-          </a:p>
-          <a:p>
-            <a:pPr marL="0" indent="0">
-              <a:buNone/>
-            </a:pPr>
-            <a:r>
-              <a:rPr lang="en-US" altLang="ja-JP" sz="2800" dirty="0" smtClean="0"/>
-              <a:t>	" </a:t>
-            </a:r>
-            <a:r>
-              <a:rPr lang="en-US" altLang="ja-JP" sz="2800" dirty="0"/>
-              <a:t>while (#{</a:t>
-            </a:r>
-            <a:r>
-              <a:rPr lang="en-US" altLang="ja-JP" sz="2800" dirty="0" err="1"/>
-              <a:t>condition.to_ruby</a:t>
-            </a:r>
-            <a:r>
-              <a:rPr lang="en-US" altLang="ja-JP" sz="2800" dirty="0"/>
-              <a:t>}).call(e); e = </a:t>
-            </a:r>
-            <a:endParaRPr lang="en-US" altLang="ja-JP" sz="2800" dirty="0" smtClean="0"/>
-          </a:p>
-          <a:p>
-            <a:pPr marL="0" indent="0">
-              <a:buNone/>
-            </a:pPr>
-            <a:r>
-              <a:rPr lang="en-US" altLang="ja-JP" sz="2800" dirty="0"/>
-              <a:t>	</a:t>
-            </a:r>
-            <a:r>
-              <a:rPr lang="en-US" altLang="ja-JP" sz="2800" dirty="0" smtClean="0"/>
-              <a:t>   (#{</a:t>
-            </a:r>
-            <a:r>
-              <a:rPr lang="en-US" altLang="ja-JP" sz="2800" dirty="0" err="1"/>
-              <a:t>body.to_ruby</a:t>
-            </a:r>
-            <a:r>
-              <a:rPr lang="en-US" altLang="ja-JP" sz="2800" dirty="0"/>
-              <a:t>}).call(e); end;" +</a:t>
-            </a:r>
-          </a:p>
-          <a:p>
-            <a:pPr marL="0" indent="0">
-              <a:buNone/>
-            </a:pPr>
-            <a:r>
-              <a:rPr lang="en-US" altLang="ja-JP" sz="2800" dirty="0"/>
-              <a:t>	</a:t>
-            </a:r>
-            <a:r>
-              <a:rPr lang="en-US" altLang="ja-JP" sz="2800" dirty="0" smtClean="0"/>
-              <a:t>" </a:t>
-            </a:r>
-            <a:r>
-              <a:rPr lang="en-US" altLang="ja-JP" sz="2800" dirty="0"/>
-              <a:t>e" +</a:t>
-            </a:r>
-          </a:p>
-          <a:p>
-            <a:pPr marL="0" indent="0">
-              <a:buNone/>
-            </a:pPr>
-            <a:r>
-              <a:rPr lang="en-US" altLang="ja-JP" sz="2800" dirty="0" smtClean="0"/>
-              <a:t>	"</a:t>
-            </a:r>
-            <a:r>
-              <a:rPr lang="ja-JP" altLang="en-US" sz="2800" dirty="0" smtClean="0"/>
-              <a:t> </a:t>
-            </a:r>
-            <a:r>
-              <a:rPr lang="en-US" altLang="ja-JP" sz="2800" dirty="0"/>
-              <a:t>}"</a:t>
-            </a:r>
+              <a:t>	end</a:t>
+            </a:r>
+            <a:endParaRPr lang="en-US" altLang="ja-JP" sz="2800" dirty="0"/>
           </a:p>
           <a:p>
             <a:pPr marL="0" indent="0">
@@ -6567,105 +7184,60 @@
               <a:buNone/>
             </a:pPr>
             <a:r>
-              <a:rPr lang="en-US" altLang="ja-JP" sz="2800" dirty="0" smtClean="0"/>
+              <a:rPr kumimoji="1" lang="en-US" altLang="ja-JP" sz="2800" dirty="0" smtClean="0"/>
               <a:t>	</a:t>
             </a:r>
             <a:r>
-              <a:rPr lang="ja-JP" altLang="en-US" sz="2800" dirty="0" smtClean="0"/>
-              <a:t>・今回は</a:t>
-            </a:r>
-            <a:r>
-              <a:rPr lang="en-US" altLang="ja-JP" sz="2800" dirty="0" smtClean="0"/>
-              <a:t>Ruby</a:t>
-            </a:r>
-            <a:r>
-              <a:rPr lang="ja-JP" altLang="en-US" sz="2800" dirty="0" smtClean="0"/>
-              <a:t>の</a:t>
-            </a:r>
-            <a:r>
-              <a:rPr lang="en-US" altLang="ja-JP" sz="2800" dirty="0" smtClean="0"/>
-              <a:t>While</a:t>
-            </a:r>
-            <a:r>
-              <a:rPr lang="ja-JP" altLang="en-US" sz="2800" dirty="0" smtClean="0"/>
-              <a:t>へ翻訳</a:t>
-            </a:r>
-            <a:endParaRPr lang="en-US" altLang="ja-JP" sz="2800" dirty="0" smtClean="0"/>
-          </a:p>
-          <a:p>
-            <a:pPr marL="0" indent="0">
-              <a:buNone/>
-            </a:pPr>
-            <a:r>
-              <a:rPr lang="en-US" altLang="ja-JP" sz="2800" dirty="0"/>
-              <a:t>	</a:t>
-            </a:r>
-            <a:r>
-              <a:rPr lang="ja-JP" altLang="en-US" sz="2800" dirty="0" smtClean="0"/>
-              <a:t>⇛これだけでは振る舞いはわからない</a:t>
-            </a:r>
-            <a:endParaRPr lang="en-US" altLang="ja-JP" sz="2800" dirty="0" smtClean="0"/>
-          </a:p>
-          <a:p>
-            <a:pPr marL="0" indent="0">
-              <a:buNone/>
-            </a:pPr>
-            <a:r>
-              <a:rPr lang="en-US" altLang="ja-JP" sz="2800" dirty="0" smtClean="0"/>
-              <a:t>	</a:t>
-            </a:r>
-            <a:r>
-              <a:rPr lang="ja-JP" altLang="en-US" sz="2800" dirty="0" smtClean="0"/>
-              <a:t>⇛</a:t>
-            </a:r>
-            <a:r>
-              <a:rPr lang="en-US" altLang="ja-JP" sz="2800" dirty="0" smtClean="0">
+              <a:rPr kumimoji="1" lang="ja-JP" altLang="en-US" sz="2800" dirty="0" smtClean="0"/>
+              <a:t>・自身を</a:t>
+            </a:r>
+            <a:r>
+              <a:rPr kumimoji="1" lang="ja-JP" altLang="en-US" sz="2800" dirty="0" smtClean="0">
                 <a:solidFill>
                   <a:srgbClr val="FF0000"/>
                 </a:solidFill>
               </a:rPr>
-              <a:t>Ruby</a:t>
-            </a:r>
-            <a:r>
-              <a:rPr lang="ja-JP" altLang="en-US" sz="2800" dirty="0" smtClean="0">
-                <a:solidFill>
-                  <a:srgbClr val="FF0000"/>
-                </a:solidFill>
-              </a:rPr>
-              <a:t>の</a:t>
-            </a:r>
-            <a:r>
-              <a:rPr lang="en-US" altLang="ja-JP" sz="2800" dirty="0" smtClean="0">
-                <a:solidFill>
-                  <a:srgbClr val="FF0000"/>
-                </a:solidFill>
-              </a:rPr>
-              <a:t>while</a:t>
+              <a:t>再帰</a:t>
+            </a:r>
+            <a:r>
+              <a:rPr kumimoji="1" lang="ja-JP" altLang="en-US" sz="2800" dirty="0" smtClean="0"/>
+              <a:t>呼び出ししてループ</a:t>
+            </a:r>
+            <a:endParaRPr kumimoji="1" lang="en-US" altLang="ja-JP" sz="2800" dirty="0" smtClean="0"/>
+          </a:p>
+          <a:p>
+            <a:pPr marL="0" indent="0">
+              <a:buNone/>
+            </a:pPr>
+            <a:r>
+              <a:rPr lang="en-US" altLang="ja-JP" sz="2800" dirty="0"/>
+              <a:t>	</a:t>
             </a:r>
             <a:r>
               <a:rPr lang="ja-JP" altLang="en-US" sz="2800" dirty="0" smtClean="0"/>
-              <a:t>ループの動作理解が必要</a:t>
-            </a:r>
-            <a:endParaRPr lang="en-US" altLang="ja-JP" sz="2800" dirty="0"/>
-          </a:p>
-          <a:p>
-            <a:pPr marL="0" indent="0">
-              <a:buNone/>
-            </a:pPr>
-            <a:endParaRPr lang="en-US" altLang="ja-JP" dirty="0"/>
+              <a:t>・ループ全体の振る舞い</a:t>
+            </a:r>
+            <a:endParaRPr kumimoji="1" lang="ja-JP" altLang="en-US" sz="2800" dirty="0"/>
           </a:p>
         </p:txBody>
       </p:sp>
     </p:spTree>
     <p:extLst>
       <p:ext uri="{BB962C8B-B14F-4D97-AF65-F5344CB8AC3E}">
-        <p14:creationId xmlns:p14="http://schemas.microsoft.com/office/powerpoint/2010/main" val="2733681830"/>
+        <p14:creationId xmlns:p14="http://schemas.microsoft.com/office/powerpoint/2010/main" val="1426820628"/>
       </p:ext>
     </p:extLst>
   </p:cSld>
   <p:clrMapOvr>
     <a:masterClrMapping/>
   </p:clrMapOvr>
+  <p:timing>
+    <p:tnLst>
+      <p:par>
+        <p:cTn id="1" dur="indefinite" restart="never" nodeType="tmRoot"/>
+      </p:par>
+    </p:tnLst>
+  </p:timing>
 </p:sld>
 </file>
 
@@ -6688,532 +7260,267 @@
       </p:grpSpPr>
       <p:sp>
         <p:nvSpPr>
-          <p:cNvPr id="2" name="タイトル 1"/>
-          <p:cNvSpPr>
-            <a:spLocks noGrp="1"/>
-          </p:cNvSpPr>
-          <p:nvPr>
-            <p:ph type="title"/>
+          <p:cNvPr id="3" name="コンテンツ プレースホルダー 2"/>
+          <p:cNvSpPr>
+            <a:spLocks noGrp="1"/>
+          </p:cNvSpPr>
+          <p:nvPr>
+            <p:ph idx="1"/>
           </p:nvPr>
         </p:nvSpPr>
         <p:spPr>
           <a:xfrm>
-            <a:off x="467544" y="145761"/>
-            <a:ext cx="8229600" cy="1143000"/>
+            <a:off x="457200" y="692696"/>
+            <a:ext cx="8229600" cy="5433467"/>
           </a:xfrm>
         </p:spPr>
         <p:txBody>
-          <a:bodyPr/>
-          <a:lstStyle/>
-          <a:p>
+          <a:bodyPr>
+            <a:normAutofit lnSpcReduction="10000"/>
+          </a:bodyPr>
+          <a:lstStyle/>
+          <a:p>
+            <a:pPr marL="0" indent="0">
+              <a:buNone/>
+            </a:pPr>
             <a:r>
               <a:rPr kumimoji="1" lang="ja-JP" altLang="en-US" dirty="0" smtClean="0"/>
-              <a:t>応用</a:t>
-            </a:r>
-            <a:endParaRPr kumimoji="1" lang="ja-JP" altLang="en-US" dirty="0"/>
-          </a:p>
-        </p:txBody>
-      </p:sp>
-      <p:sp>
-        <p:nvSpPr>
-          <p:cNvPr id="4" name="角丸四角形 3"/>
-          <p:cNvSpPr/>
-          <p:nvPr/>
-        </p:nvSpPr>
-        <p:spPr>
-          <a:xfrm>
-            <a:off x="5076056" y="1442834"/>
-            <a:ext cx="1584176" cy="1136263"/>
-          </a:xfrm>
-          <a:prstGeom prst="roundRect">
-            <a:avLst/>
-          </a:prstGeom>
-        </p:spPr>
-        <p:style>
-          <a:lnRef idx="0">
-            <a:schemeClr val="accent2"/>
-          </a:lnRef>
-          <a:fillRef idx="3">
-            <a:schemeClr val="accent2"/>
-          </a:fillRef>
-          <a:effectRef idx="3">
-            <a:schemeClr val="accent2"/>
-          </a:effectRef>
-          <a:fontRef idx="minor">
-            <a:schemeClr val="lt1"/>
-          </a:fontRef>
-        </p:style>
-        <p:txBody>
-          <a:bodyPr rtlCol="0" anchor="ctr"/>
-          <a:lstStyle/>
-          <a:p>
-            <a:pPr algn="ctr"/>
-            <a:r>
-              <a:rPr kumimoji="1" lang="en-US" altLang="ja-JP" sz="2800" b="1" dirty="0" smtClean="0"/>
+              <a:t>表示的意味論</a:t>
+            </a:r>
+            <a:endParaRPr kumimoji="1" lang="en-US" altLang="ja-JP" dirty="0" smtClean="0"/>
+          </a:p>
+          <a:p>
+            <a:pPr marL="0" indent="0">
+              <a:buNone/>
+            </a:pPr>
+            <a:r>
+              <a:rPr lang="en-US" altLang="ja-JP" sz="2800" dirty="0" err="1" smtClean="0"/>
+              <a:t>def</a:t>
+            </a:r>
+            <a:r>
+              <a:rPr lang="en-US" altLang="ja-JP" sz="2800" dirty="0" smtClean="0"/>
+              <a:t> </a:t>
+            </a:r>
+            <a:r>
+              <a:rPr lang="en-US" altLang="ja-JP" sz="2800" dirty="0" err="1"/>
+              <a:t>to_ruby</a:t>
+            </a:r>
+            <a:endParaRPr lang="en-US" altLang="ja-JP" sz="2800" dirty="0"/>
+          </a:p>
+          <a:p>
+            <a:pPr marL="0" indent="0">
+              <a:buNone/>
+            </a:pPr>
+            <a:r>
+              <a:rPr lang="en-US" altLang="ja-JP" sz="2800" dirty="0" smtClean="0"/>
+              <a:t>	"-&gt; </a:t>
+            </a:r>
+            <a:r>
+              <a:rPr lang="en-US" altLang="ja-JP" sz="2800" dirty="0"/>
+              <a:t>e {" +</a:t>
+            </a:r>
+          </a:p>
+          <a:p>
+            <a:pPr marL="0" indent="0">
+              <a:buNone/>
+            </a:pPr>
+            <a:r>
+              <a:rPr lang="en-US" altLang="ja-JP" sz="2800" dirty="0" smtClean="0"/>
+              <a:t>	" </a:t>
+            </a:r>
+            <a:r>
+              <a:rPr lang="en-US" altLang="ja-JP" sz="2800" dirty="0"/>
+              <a:t>while (#{</a:t>
+            </a:r>
+            <a:r>
+              <a:rPr lang="en-US" altLang="ja-JP" sz="2800" dirty="0" err="1"/>
+              <a:t>condition.to_ruby</a:t>
+            </a:r>
+            <a:r>
+              <a:rPr lang="en-US" altLang="ja-JP" sz="2800" dirty="0"/>
+              <a:t>}).call(e); e = </a:t>
+            </a:r>
+            <a:endParaRPr lang="en-US" altLang="ja-JP" sz="2800" dirty="0" smtClean="0"/>
+          </a:p>
+          <a:p>
+            <a:pPr marL="0" indent="0">
+              <a:buNone/>
+            </a:pPr>
+            <a:r>
+              <a:rPr lang="en-US" altLang="ja-JP" sz="2800" dirty="0"/>
+              <a:t>	</a:t>
+            </a:r>
+            <a:r>
+              <a:rPr lang="en-US" altLang="ja-JP" sz="2800" dirty="0" smtClean="0"/>
+              <a:t>   (#{</a:t>
+            </a:r>
+            <a:r>
+              <a:rPr lang="en-US" altLang="ja-JP" sz="2800" dirty="0" err="1"/>
+              <a:t>body.to_ruby</a:t>
+            </a:r>
+            <a:r>
+              <a:rPr lang="en-US" altLang="ja-JP" sz="2800" dirty="0"/>
+              <a:t>}).call(e); end;" +</a:t>
+            </a:r>
+          </a:p>
+          <a:p>
+            <a:pPr marL="0" indent="0">
+              <a:buNone/>
+            </a:pPr>
+            <a:r>
+              <a:rPr lang="en-US" altLang="ja-JP" sz="2800" dirty="0"/>
+              <a:t>	</a:t>
+            </a:r>
+            <a:r>
+              <a:rPr lang="en-US" altLang="ja-JP" sz="2800" dirty="0" smtClean="0"/>
+              <a:t>" </a:t>
+            </a:r>
+            <a:r>
+              <a:rPr lang="en-US" altLang="ja-JP" sz="2800" dirty="0"/>
+              <a:t>e" +</a:t>
+            </a:r>
+          </a:p>
+          <a:p>
+            <a:pPr marL="0" indent="0">
+              <a:buNone/>
+            </a:pPr>
+            <a:r>
+              <a:rPr lang="en-US" altLang="ja-JP" sz="2800" dirty="0" smtClean="0"/>
+              <a:t>	"</a:t>
+            </a:r>
+            <a:r>
+              <a:rPr lang="ja-JP" altLang="en-US" sz="2800" dirty="0" smtClean="0"/>
+              <a:t> </a:t>
+            </a:r>
+            <a:r>
+              <a:rPr lang="en-US" altLang="ja-JP" sz="2800" dirty="0"/>
+              <a:t>}"</a:t>
+            </a:r>
+          </a:p>
+          <a:p>
+            <a:pPr marL="0" indent="0">
+              <a:buNone/>
+            </a:pPr>
+            <a:r>
+              <a:rPr lang="en-US" altLang="ja-JP" sz="2800" dirty="0"/>
+              <a:t>e</a:t>
+            </a:r>
+            <a:r>
+              <a:rPr lang="en-US" altLang="ja-JP" sz="2800" dirty="0" smtClean="0"/>
+              <a:t>nd</a:t>
+            </a:r>
+          </a:p>
+          <a:p>
+            <a:pPr marL="0" indent="0">
+              <a:buNone/>
+            </a:pPr>
+            <a:r>
+              <a:rPr lang="en-US" altLang="ja-JP" sz="2800" dirty="0" smtClean="0"/>
+              <a:t>	</a:t>
+            </a:r>
+            <a:r>
+              <a:rPr lang="ja-JP" altLang="en-US" sz="2800" dirty="0" smtClean="0"/>
+              <a:t>・今回は</a:t>
+            </a:r>
+            <a:r>
+              <a:rPr lang="en-US" altLang="ja-JP" sz="2800" dirty="0" smtClean="0"/>
               <a:t>Ruby</a:t>
             </a:r>
-          </a:p>
-          <a:p>
-            <a:pPr algn="ctr"/>
-            <a:r>
-              <a:rPr lang="ja-JP" altLang="en-US" sz="2800" b="1" dirty="0"/>
-              <a:t>コード</a:t>
-            </a:r>
-            <a:endParaRPr kumimoji="1" lang="ja-JP" altLang="en-US" sz="2800" b="1" dirty="0"/>
-          </a:p>
-        </p:txBody>
-      </p:sp>
-      <p:sp>
-        <p:nvSpPr>
-          <p:cNvPr id="5" name="右矢印 4"/>
-          <p:cNvSpPr/>
-          <p:nvPr/>
-        </p:nvSpPr>
-        <p:spPr>
-          <a:xfrm>
-            <a:off x="3851920" y="1326552"/>
-            <a:ext cx="936104" cy="1252547"/>
-          </a:xfrm>
-          <a:prstGeom prst="rightArrow">
-            <a:avLst/>
-          </a:prstGeom>
-        </p:spPr>
-        <p:style>
-          <a:lnRef idx="2">
-            <a:schemeClr val="accent1">
-              <a:shade val="50000"/>
-            </a:schemeClr>
-          </a:lnRef>
-          <a:fillRef idx="1">
-            <a:schemeClr val="accent1"/>
-          </a:fillRef>
-          <a:effectRef idx="0">
-            <a:schemeClr val="accent1"/>
-          </a:effectRef>
-          <a:fontRef idx="minor">
-            <a:schemeClr val="lt1"/>
-          </a:fontRef>
-        </p:style>
-        <p:txBody>
-          <a:bodyPr rtlCol="0" anchor="ctr"/>
-          <a:lstStyle/>
-          <a:p>
-            <a:pPr algn="ctr"/>
-            <a:r>
-              <a:rPr lang="ja-JP" altLang="en-US" sz="2000" b="1" dirty="0">
+            <a:r>
+              <a:rPr lang="ja-JP" altLang="en-US" sz="2800" dirty="0" smtClean="0"/>
+              <a:t>の</a:t>
+            </a:r>
+            <a:r>
+              <a:rPr lang="en-US" altLang="ja-JP" sz="2800" dirty="0" smtClean="0"/>
+              <a:t>While</a:t>
+            </a:r>
+            <a:r>
+              <a:rPr lang="ja-JP" altLang="en-US" sz="2800" dirty="0" smtClean="0"/>
+              <a:t>へ翻訳</a:t>
+            </a:r>
+            <a:endParaRPr lang="en-US" altLang="ja-JP" sz="2800" dirty="0" smtClean="0"/>
+          </a:p>
+          <a:p>
+            <a:pPr marL="0" indent="0">
+              <a:buNone/>
+            </a:pPr>
+            <a:r>
+              <a:rPr lang="en-US" altLang="ja-JP" sz="2800" dirty="0"/>
+              <a:t>	</a:t>
+            </a:r>
+            <a:r>
+              <a:rPr lang="ja-JP" altLang="en-US" sz="2800" dirty="0" smtClean="0"/>
+              <a:t>⇛これだけでは振る舞いはわからない</a:t>
+            </a:r>
+            <a:endParaRPr lang="en-US" altLang="ja-JP" sz="2800" dirty="0" smtClean="0"/>
+          </a:p>
+          <a:p>
+            <a:pPr marL="0" indent="0">
+              <a:buNone/>
+            </a:pPr>
+            <a:r>
+              <a:rPr lang="en-US" altLang="ja-JP" sz="2800" dirty="0" smtClean="0"/>
+              <a:t>	</a:t>
+            </a:r>
+            <a:r>
+              <a:rPr lang="ja-JP" altLang="en-US" sz="2800" dirty="0" smtClean="0"/>
+              <a:t>⇛</a:t>
+            </a:r>
+            <a:r>
+              <a:rPr lang="en-US" altLang="ja-JP" sz="2800" dirty="0" smtClean="0">
                 <a:solidFill>
-                  <a:schemeClr val="bg1"/>
+                  <a:srgbClr val="FF0000"/>
                 </a:solidFill>
               </a:rPr>
-              <a:t>変換</a:t>
-            </a:r>
-            <a:endParaRPr kumimoji="1" lang="ja-JP" altLang="en-US" b="1" dirty="0">
-              <a:solidFill>
-                <a:schemeClr val="bg1"/>
-              </a:solidFill>
-            </a:endParaRPr>
-          </a:p>
-        </p:txBody>
-      </p:sp>
-      <p:sp>
-        <p:nvSpPr>
-          <p:cNvPr id="7" name="右矢印 6"/>
-          <p:cNvSpPr/>
-          <p:nvPr/>
-        </p:nvSpPr>
-        <p:spPr>
-          <a:xfrm>
-            <a:off x="3851920" y="3356992"/>
-            <a:ext cx="936104" cy="1252547"/>
-          </a:xfrm>
-          <a:prstGeom prst="rightArrow">
-            <a:avLst/>
-          </a:prstGeom>
-        </p:spPr>
-        <p:style>
-          <a:lnRef idx="2">
-            <a:schemeClr val="accent1">
-              <a:shade val="50000"/>
-            </a:schemeClr>
-          </a:lnRef>
-          <a:fillRef idx="1">
-            <a:schemeClr val="accent1"/>
-          </a:fillRef>
-          <a:effectRef idx="0">
-            <a:schemeClr val="accent1"/>
-          </a:effectRef>
-          <a:fontRef idx="minor">
-            <a:schemeClr val="lt1"/>
-          </a:fontRef>
-        </p:style>
-        <p:txBody>
-          <a:bodyPr rtlCol="0" anchor="ctr"/>
-          <a:lstStyle/>
-          <a:p>
-            <a:pPr algn="ctr"/>
-            <a:r>
-              <a:rPr lang="ja-JP" altLang="en-US" sz="2000" b="1" dirty="0">
+              <a:t>Ruby</a:t>
+            </a:r>
+            <a:r>
+              <a:rPr lang="ja-JP" altLang="en-US" sz="2800" dirty="0" smtClean="0">
                 <a:solidFill>
-                  <a:schemeClr val="bg1"/>
+                  <a:srgbClr val="FF0000"/>
                 </a:solidFill>
               </a:rPr>
-              <a:t>変換</a:t>
-            </a:r>
-            <a:endParaRPr kumimoji="1" lang="ja-JP" altLang="en-US" b="1" dirty="0">
-              <a:solidFill>
-                <a:schemeClr val="bg1"/>
-              </a:solidFill>
-            </a:endParaRPr>
-          </a:p>
-        </p:txBody>
-      </p:sp>
-      <p:sp>
-        <p:nvSpPr>
-          <p:cNvPr id="8" name="右矢印 7"/>
-          <p:cNvSpPr/>
-          <p:nvPr/>
-        </p:nvSpPr>
-        <p:spPr>
-          <a:xfrm>
-            <a:off x="3851920" y="4797152"/>
-            <a:ext cx="936104" cy="1252547"/>
-          </a:xfrm>
-          <a:prstGeom prst="rightArrow">
-            <a:avLst/>
-          </a:prstGeom>
-        </p:spPr>
-        <p:style>
-          <a:lnRef idx="2">
-            <a:schemeClr val="accent1">
-              <a:shade val="50000"/>
-            </a:schemeClr>
-          </a:lnRef>
-          <a:fillRef idx="1">
-            <a:schemeClr val="accent1"/>
-          </a:fillRef>
-          <a:effectRef idx="0">
-            <a:schemeClr val="accent1"/>
-          </a:effectRef>
-          <a:fontRef idx="minor">
-            <a:schemeClr val="lt1"/>
-          </a:fontRef>
-        </p:style>
-        <p:txBody>
-          <a:bodyPr rtlCol="0" anchor="ctr"/>
-          <a:lstStyle/>
-          <a:p>
-            <a:pPr algn="ctr"/>
-            <a:r>
-              <a:rPr lang="ja-JP" altLang="en-US" sz="2000" b="1" dirty="0">
+              <a:t>の</a:t>
+            </a:r>
+            <a:r>
+              <a:rPr lang="en-US" altLang="ja-JP" sz="2800" dirty="0" smtClean="0">
                 <a:solidFill>
-                  <a:schemeClr val="bg1"/>
+                  <a:srgbClr val="FF0000"/>
                 </a:solidFill>
               </a:rPr>
-              <a:t>変換</a:t>
-            </a:r>
-            <a:endParaRPr kumimoji="1" lang="ja-JP" altLang="en-US" b="1" dirty="0">
-              <a:solidFill>
-                <a:schemeClr val="bg1"/>
-              </a:solidFill>
-            </a:endParaRPr>
-          </a:p>
-        </p:txBody>
-      </p:sp>
-      <p:pic>
-        <p:nvPicPr>
-          <p:cNvPr id="1026" name="Picture 2" descr="D:\Temp\Temporary Internet Files\Content.IE5\0PIY0UOG\abc2[1].jpg"/>
-          <p:cNvPicPr>
-            <a:picLocks noChangeAspect="1" noChangeArrowheads="1"/>
-          </p:cNvPicPr>
-          <p:nvPr/>
-        </p:nvPicPr>
-        <p:blipFill>
-          <a:blip r:embed="rId2" cstate="print">
-            <a:extLst>
-              <a:ext uri="{28A0092B-C50C-407E-A947-70E740481C1C}">
-                <a14:useLocalDpi xmlns:a14="http://schemas.microsoft.com/office/drawing/2010/main" val="0"/>
-              </a:ext>
-            </a:extLst>
-          </a:blip>
-          <a:srcRect/>
-          <a:stretch>
-            <a:fillRect/>
-          </a:stretch>
-        </p:blipFill>
-        <p:spPr bwMode="auto">
-          <a:xfrm>
-            <a:off x="5091562" y="3641200"/>
-            <a:ext cx="1590943" cy="1147752"/>
-          </a:xfrm>
-          <a:prstGeom prst="rect">
-            <a:avLst/>
-          </a:prstGeom>
-          <a:noFill/>
-          <a:extLst>
-            <a:ext uri="{909E8E84-426E-40DD-AFC4-6F175D3DCCD1}">
-              <a14:hiddenFill xmlns:a14="http://schemas.microsoft.com/office/drawing/2010/main">
-                <a:solidFill>
-                  <a:srgbClr val="FFFFFF"/>
-                </a:solidFill>
-              </a14:hiddenFill>
-            </a:ext>
-          </a:extLst>
-        </p:spPr>
-      </p:pic>
-      <p:sp>
-        <p:nvSpPr>
-          <p:cNvPr id="9" name="テキスト ボックス 8"/>
-          <p:cNvSpPr txBox="1"/>
-          <p:nvPr/>
-        </p:nvSpPr>
-        <p:spPr>
-          <a:xfrm>
-            <a:off x="5468034" y="3375698"/>
-            <a:ext cx="800219" cy="461665"/>
-          </a:xfrm>
-          <a:prstGeom prst="rect">
-            <a:avLst/>
-          </a:prstGeom>
-          <a:noFill/>
-        </p:spPr>
-        <p:txBody>
-          <a:bodyPr wrap="none" rtlCol="0">
-            <a:spAutoFit/>
-          </a:bodyPr>
-          <a:lstStyle/>
-          <a:p>
-            <a:r>
-              <a:rPr lang="ja-JP" altLang="en-US" sz="2400" b="1" dirty="0"/>
-              <a:t>英語</a:t>
-            </a:r>
-            <a:endParaRPr kumimoji="1" lang="ja-JP" altLang="en-US" b="1" dirty="0"/>
-          </a:p>
-        </p:txBody>
-      </p:sp>
-      <p:pic>
-        <p:nvPicPr>
-          <p:cNvPr id="1027" name="Picture 3" descr="D:\Temp\Temporary Internet Files\Content.IE5\G4A5GR24\gi01a201312111400[1].png"/>
-          <p:cNvPicPr>
-            <a:picLocks noChangeAspect="1" noChangeArrowheads="1"/>
-          </p:cNvPicPr>
-          <p:nvPr/>
-        </p:nvPicPr>
-        <p:blipFill>
-          <a:blip r:embed="rId3" cstate="print">
-            <a:extLst>
-              <a:ext uri="{28A0092B-C50C-407E-A947-70E740481C1C}">
-                <a14:useLocalDpi xmlns:a14="http://schemas.microsoft.com/office/drawing/2010/main" val="0"/>
-              </a:ext>
-            </a:extLst>
-          </a:blip>
-          <a:srcRect/>
-          <a:stretch>
-            <a:fillRect/>
-          </a:stretch>
-        </p:blipFill>
-        <p:spPr bwMode="auto">
-          <a:xfrm>
-            <a:off x="4853419" y="5423425"/>
-            <a:ext cx="2029447" cy="1086599"/>
-          </a:xfrm>
-          <a:prstGeom prst="rect">
-            <a:avLst/>
-          </a:prstGeom>
-          <a:noFill/>
-          <a:extLst>
-            <a:ext uri="{909E8E84-426E-40DD-AFC4-6F175D3DCCD1}">
-              <a14:hiddenFill xmlns:a14="http://schemas.microsoft.com/office/drawing/2010/main">
-                <a:solidFill>
-                  <a:srgbClr val="FFFFFF"/>
-                </a:solidFill>
-              </a14:hiddenFill>
-            </a:ext>
-          </a:extLst>
-        </p:spPr>
-      </p:pic>
-      <p:sp>
-        <p:nvSpPr>
-          <p:cNvPr id="12" name="テキスト ボックス 11"/>
-          <p:cNvSpPr txBox="1"/>
-          <p:nvPr/>
-        </p:nvSpPr>
-        <p:spPr>
-          <a:xfrm>
-            <a:off x="5021251" y="4960998"/>
-            <a:ext cx="1731564" cy="461665"/>
-          </a:xfrm>
-          <a:prstGeom prst="rect">
-            <a:avLst/>
-          </a:prstGeom>
-          <a:noFill/>
-        </p:spPr>
-        <p:txBody>
-          <a:bodyPr wrap="none" rtlCol="0">
-            <a:spAutoFit/>
-          </a:bodyPr>
-          <a:lstStyle/>
-          <a:p>
-            <a:r>
-              <a:rPr lang="ja-JP" altLang="en-US" sz="2400" b="1" dirty="0"/>
-              <a:t>数学的表記</a:t>
-            </a:r>
-            <a:endParaRPr kumimoji="1" lang="ja-JP" altLang="en-US" b="1" dirty="0"/>
-          </a:p>
-        </p:txBody>
-      </p:sp>
-      <p:sp>
-        <p:nvSpPr>
-          <p:cNvPr id="10" name="コンテンツ プレースホルダー 9"/>
-          <p:cNvSpPr>
-            <a:spLocks noGrp="1"/>
-          </p:cNvSpPr>
-          <p:nvPr>
-            <p:ph idx="1"/>
-          </p:nvPr>
-        </p:nvSpPr>
-        <p:spPr>
-          <a:xfrm>
-            <a:off x="467544" y="1326552"/>
-            <a:ext cx="8229600" cy="5933256"/>
-          </a:xfrm>
-        </p:spPr>
-        <p:txBody>
-          <a:bodyPr>
-            <a:normAutofit/>
-          </a:bodyPr>
-          <a:lstStyle/>
+              <a:t>while</a:t>
+            </a:r>
+            <a:r>
+              <a:rPr lang="ja-JP" altLang="en-US" sz="2800" dirty="0" smtClean="0"/>
+              <a:t>ループの動作理解が必要</a:t>
+            </a:r>
+            <a:endParaRPr lang="en-US" altLang="ja-JP" sz="2800" dirty="0"/>
+          </a:p>
           <a:p>
             <a:pPr marL="0" indent="0">
               <a:buNone/>
             </a:pPr>
             <a:endParaRPr lang="en-US" altLang="ja-JP" dirty="0"/>
-          </a:p>
-          <a:p>
-            <a:pPr marL="0" indent="0">
-              <a:buNone/>
-            </a:pPr>
-            <a:r>
-              <a:rPr kumimoji="1" lang="en-US" altLang="ja-JP" dirty="0" smtClean="0"/>
-              <a:t>							</a:t>
-            </a:r>
-            <a:r>
-              <a:rPr kumimoji="1" lang="ja-JP" altLang="en-US" dirty="0" smtClean="0"/>
-              <a:t>← 今回</a:t>
-            </a:r>
-            <a:endParaRPr kumimoji="1" lang="en-US" altLang="ja-JP" dirty="0" smtClean="0"/>
-          </a:p>
-          <a:p>
-            <a:pPr marL="0" indent="0">
-              <a:buNone/>
-            </a:pPr>
-            <a:endParaRPr lang="en-US" altLang="ja-JP" dirty="0"/>
-          </a:p>
-          <a:p>
-            <a:pPr marL="0" indent="0">
-              <a:buNone/>
-            </a:pPr>
-            <a:endParaRPr kumimoji="1" lang="en-US" altLang="ja-JP" dirty="0" smtClean="0"/>
-          </a:p>
-          <a:p>
-            <a:pPr marL="0" indent="0">
-              <a:buNone/>
-            </a:pPr>
-            <a:endParaRPr lang="en-US" altLang="ja-JP" dirty="0"/>
-          </a:p>
-          <a:p>
-            <a:pPr marL="0" indent="0">
-              <a:buNone/>
-            </a:pPr>
-            <a:endParaRPr kumimoji="1" lang="en-US" altLang="ja-JP" dirty="0" smtClean="0"/>
-          </a:p>
-          <a:p>
-            <a:pPr marL="0" indent="0">
-              <a:buNone/>
-            </a:pPr>
-            <a:endParaRPr lang="en-US" altLang="ja-JP" dirty="0"/>
-          </a:p>
-          <a:p>
-            <a:pPr marL="0" indent="0">
-              <a:buNone/>
-            </a:pPr>
-            <a:endParaRPr lang="en-US" altLang="ja-JP" sz="3600" dirty="0" smtClean="0"/>
-          </a:p>
-          <a:p>
-            <a:pPr marL="0" indent="0">
-              <a:buNone/>
-            </a:pPr>
-            <a:r>
-              <a:rPr lang="ja-JP" altLang="en-US" sz="3600" dirty="0" smtClean="0"/>
-              <a:t>どれでも</a:t>
-            </a:r>
-            <a:r>
-              <a:rPr lang="en-US" altLang="ja-JP" sz="3600" dirty="0" smtClean="0"/>
-              <a:t>OK</a:t>
-            </a:r>
-            <a:endParaRPr kumimoji="1" lang="ja-JP" altLang="en-US" sz="3600" dirty="0"/>
-          </a:p>
-        </p:txBody>
-      </p:sp>
-      <p:sp>
-        <p:nvSpPr>
-          <p:cNvPr id="14" name="角丸四角形 13"/>
-          <p:cNvSpPr/>
-          <p:nvPr/>
-        </p:nvSpPr>
-        <p:spPr>
-          <a:xfrm>
-            <a:off x="755576" y="2718869"/>
-            <a:ext cx="2448272" cy="2242129"/>
-          </a:xfrm>
-          <a:prstGeom prst="roundRect">
-            <a:avLst/>
-          </a:prstGeom>
-        </p:spPr>
-        <p:style>
-          <a:lnRef idx="0">
-            <a:schemeClr val="accent2"/>
-          </a:lnRef>
-          <a:fillRef idx="3">
-            <a:schemeClr val="accent2"/>
-          </a:fillRef>
-          <a:effectRef idx="3">
-            <a:schemeClr val="accent2"/>
-          </a:effectRef>
-          <a:fontRef idx="minor">
-            <a:schemeClr val="lt1"/>
-          </a:fontRef>
-        </p:style>
-        <p:txBody>
-          <a:bodyPr rtlCol="0" anchor="ctr"/>
-          <a:lstStyle/>
-          <a:p>
-            <a:pPr algn="ctr"/>
-            <a:r>
-              <a:rPr lang="en-US" altLang="ja-JP" sz="2800" b="1" dirty="0" smtClean="0"/>
-              <a:t>SIMPLE</a:t>
-            </a:r>
-            <a:endParaRPr kumimoji="1" lang="en-US" altLang="ja-JP" sz="2800" b="1" dirty="0" smtClean="0"/>
-          </a:p>
-          <a:p>
-            <a:pPr algn="ctr"/>
-            <a:r>
-              <a:rPr lang="ja-JP" altLang="en-US" sz="2800" b="1" dirty="0"/>
-              <a:t>コード</a:t>
-            </a:r>
-            <a:endParaRPr kumimoji="1" lang="ja-JP" altLang="en-US" sz="2800" b="1" dirty="0"/>
           </a:p>
         </p:txBody>
       </p:sp>
     </p:spTree>
     <p:extLst>
       <p:ext uri="{BB962C8B-B14F-4D97-AF65-F5344CB8AC3E}">
-        <p14:creationId xmlns:p14="http://schemas.microsoft.com/office/powerpoint/2010/main" val="2900545820"/>
+        <p14:creationId xmlns:p14="http://schemas.microsoft.com/office/powerpoint/2010/main" val="2733681830"/>
       </p:ext>
     </p:extLst>
   </p:cSld>
   <p:clrMapOvr>
     <a:masterClrMapping/>
   </p:clrMapOvr>
+  <p:timing>
+    <p:tnLst>
+      <p:par>
+        <p:cTn id="1" dur="indefinite" restart="never" nodeType="tmRoot"/>
+      </p:par>
+    </p:tnLst>
+  </p:timing>
 </p:sld>
 </file>
 

</xml_diff>